<commit_message>
Cleaned up formatting and added post header for template
</commit_message>
<xml_diff>
--- a/src/assets/graphics/PPT/post-headers.pptx
+++ b/src/assets/graphics/PPT/post-headers.pptx
@@ -7,6 +7,7 @@
   <p:sldIdLst>
     <p:sldId id="271" r:id="rId2"/>
     <p:sldId id="274" r:id="rId3"/>
+    <p:sldId id="275" r:id="rId4"/>
   </p:sldIdLst>
   <p:sldSz cx="12252325" cy="5999163"/>
   <p:notesSz cx="6858000" cy="9144000"/>
@@ -1039,7 +1040,7 @@
           <a:p>
             <a:fld id="{188B2B68-3432-42CC-A797-1383801DFB53}" type="datetimeFigureOut">
               <a:rPr lang="en-US" smtClean="0"/>
-              <a:t>10/7/2020</a:t>
+              <a:t>10/8/2020</a:t>
             </a:fld>
             <a:endParaRPr lang="en-US"/>
           </a:p>
@@ -1209,7 +1210,7 @@
           <a:p>
             <a:fld id="{188B2B68-3432-42CC-A797-1383801DFB53}" type="datetimeFigureOut">
               <a:rPr lang="en-US" smtClean="0"/>
-              <a:t>10/7/2020</a:t>
+              <a:t>10/8/2020</a:t>
             </a:fld>
             <a:endParaRPr lang="en-US"/>
           </a:p>
@@ -1389,7 +1390,7 @@
           <a:p>
             <a:fld id="{188B2B68-3432-42CC-A797-1383801DFB53}" type="datetimeFigureOut">
               <a:rPr lang="en-US" smtClean="0"/>
-              <a:t>10/7/2020</a:t>
+              <a:t>10/8/2020</a:t>
             </a:fld>
             <a:endParaRPr lang="en-US"/>
           </a:p>
@@ -1559,7 +1560,7 @@
           <a:p>
             <a:fld id="{188B2B68-3432-42CC-A797-1383801DFB53}" type="datetimeFigureOut">
               <a:rPr lang="en-US" smtClean="0"/>
-              <a:t>10/7/2020</a:t>
+              <a:t>10/8/2020</a:t>
             </a:fld>
             <a:endParaRPr lang="en-US"/>
           </a:p>
@@ -1805,7 +1806,7 @@
           <a:p>
             <a:fld id="{188B2B68-3432-42CC-A797-1383801DFB53}" type="datetimeFigureOut">
               <a:rPr lang="en-US" smtClean="0"/>
-              <a:t>10/7/2020</a:t>
+              <a:t>10/8/2020</a:t>
             </a:fld>
             <a:endParaRPr lang="en-US"/>
           </a:p>
@@ -2037,7 +2038,7 @@
           <a:p>
             <a:fld id="{188B2B68-3432-42CC-A797-1383801DFB53}" type="datetimeFigureOut">
               <a:rPr lang="en-US" smtClean="0"/>
-              <a:t>10/7/2020</a:t>
+              <a:t>10/8/2020</a:t>
             </a:fld>
             <a:endParaRPr lang="en-US"/>
           </a:p>
@@ -2404,7 +2405,7 @@
           <a:p>
             <a:fld id="{188B2B68-3432-42CC-A797-1383801DFB53}" type="datetimeFigureOut">
               <a:rPr lang="en-US" smtClean="0"/>
-              <a:t>10/7/2020</a:t>
+              <a:t>10/8/2020</a:t>
             </a:fld>
             <a:endParaRPr lang="en-US"/>
           </a:p>
@@ -2522,7 +2523,7 @@
           <a:p>
             <a:fld id="{188B2B68-3432-42CC-A797-1383801DFB53}" type="datetimeFigureOut">
               <a:rPr lang="en-US" smtClean="0"/>
-              <a:t>10/7/2020</a:t>
+              <a:t>10/8/2020</a:t>
             </a:fld>
             <a:endParaRPr lang="en-US"/>
           </a:p>
@@ -2617,7 +2618,7 @@
           <a:p>
             <a:fld id="{188B2B68-3432-42CC-A797-1383801DFB53}" type="datetimeFigureOut">
               <a:rPr lang="en-US" smtClean="0"/>
-              <a:t>10/7/2020</a:t>
+              <a:t>10/8/2020</a:t>
             </a:fld>
             <a:endParaRPr lang="en-US"/>
           </a:p>
@@ -2894,7 +2895,7 @@
           <a:p>
             <a:fld id="{188B2B68-3432-42CC-A797-1383801DFB53}" type="datetimeFigureOut">
               <a:rPr lang="en-US" smtClean="0"/>
-              <a:t>10/7/2020</a:t>
+              <a:t>10/8/2020</a:t>
             </a:fld>
             <a:endParaRPr lang="en-US"/>
           </a:p>
@@ -3151,7 +3152,7 @@
           <a:p>
             <a:fld id="{188B2B68-3432-42CC-A797-1383801DFB53}" type="datetimeFigureOut">
               <a:rPr lang="en-US" smtClean="0"/>
-              <a:t>10/7/2020</a:t>
+              <a:t>10/8/2020</a:t>
             </a:fld>
             <a:endParaRPr lang="en-US"/>
           </a:p>
@@ -3364,7 +3365,7 @@
           <a:p>
             <a:fld id="{188B2B68-3432-42CC-A797-1383801DFB53}" type="datetimeFigureOut">
               <a:rPr lang="en-US" smtClean="0"/>
-              <a:t>10/7/2020</a:t>
+              <a:t>10/8/2020</a:t>
             </a:fld>
             <a:endParaRPr lang="en-US"/>
           </a:p>
@@ -4731,6 +4732,753 @@
 </p:sld>
 </file>
 
+<file path=ppt/slides/slide3.xml><?xml version="1.0" encoding="utf-8"?>
+<p:sld xmlns:a="http://schemas.openxmlformats.org/drawingml/2006/main" xmlns:r="http://schemas.openxmlformats.org/officeDocument/2006/relationships" xmlns:p="http://schemas.openxmlformats.org/presentationml/2006/main">
+  <p:cSld>
+    <p:spTree>
+      <p:nvGrpSpPr>
+        <p:cNvPr id="1" name=""/>
+        <p:cNvGrpSpPr/>
+        <p:nvPr/>
+      </p:nvGrpSpPr>
+      <p:grpSpPr>
+        <a:xfrm>
+          <a:off x="0" y="0"/>
+          <a:ext cx="0" cy="0"/>
+          <a:chOff x="0" y="0"/>
+          <a:chExt cx="0" cy="0"/>
+        </a:xfrm>
+      </p:grpSpPr>
+      <p:pic>
+        <p:nvPicPr>
+          <p:cNvPr id="5" name="Picture 4">
+            <a:extLst>
+              <a:ext uri="{FF2B5EF4-FFF2-40B4-BE49-F238E27FC236}">
+                <a16:creationId xmlns:a16="http://schemas.microsoft.com/office/drawing/2014/main" id="{3D808EC5-2024-4F2A-AB75-CA5D04F51473}"/>
+              </a:ext>
+            </a:extLst>
+          </p:cNvPr>
+          <p:cNvPicPr>
+            <a:picLocks noChangeAspect="1"/>
+          </p:cNvPicPr>
+          <p:nvPr/>
+        </p:nvPicPr>
+        <p:blipFill rotWithShape="1">
+          <a:blip r:embed="rId2"/>
+          <a:srcRect t="3108" r="26747" b="33052"/>
+          <a:stretch/>
+        </p:blipFill>
+        <p:spPr>
+          <a:xfrm>
+            <a:off x="0" y="-18998"/>
+            <a:ext cx="12252326" cy="6018161"/>
+          </a:xfrm>
+          <a:prstGeom prst="rect">
+            <a:avLst/>
+          </a:prstGeom>
+        </p:spPr>
+      </p:pic>
+      <p:sp>
+        <p:nvSpPr>
+          <p:cNvPr id="39" name="Rectangle: Rounded Corners 38">
+            <a:extLst>
+              <a:ext uri="{FF2B5EF4-FFF2-40B4-BE49-F238E27FC236}">
+                <a16:creationId xmlns:a16="http://schemas.microsoft.com/office/drawing/2014/main" id="{176A8D73-B85D-46B7-B4DF-A5A6C1E4B81F}"/>
+              </a:ext>
+            </a:extLst>
+          </p:cNvPr>
+          <p:cNvSpPr/>
+          <p:nvPr/>
+        </p:nvSpPr>
+        <p:spPr>
+          <a:xfrm>
+            <a:off x="259080" y="243840"/>
+            <a:ext cx="2162570" cy="464820"/>
+          </a:xfrm>
+          <a:prstGeom prst="roundRect">
+            <a:avLst/>
+          </a:prstGeom>
+          <a:solidFill>
+            <a:schemeClr val="tx1">
+              <a:alpha val="14000"/>
+            </a:schemeClr>
+          </a:solidFill>
+          <a:ln>
+            <a:noFill/>
+          </a:ln>
+          <a:effectLst>
+            <a:outerShdw blurRad="50800" dist="38100" dir="2700000" algn="tl" rotWithShape="0">
+              <a:prstClr val="black">
+                <a:alpha val="40000"/>
+              </a:prstClr>
+            </a:outerShdw>
+          </a:effectLst>
+        </p:spPr>
+        <p:style>
+          <a:lnRef idx="2">
+            <a:schemeClr val="accent1">
+              <a:shade val="50000"/>
+            </a:schemeClr>
+          </a:lnRef>
+          <a:fillRef idx="1">
+            <a:schemeClr val="accent1"/>
+          </a:fillRef>
+          <a:effectRef idx="0">
+            <a:schemeClr val="accent1"/>
+          </a:effectRef>
+          <a:fontRef idx="minor">
+            <a:schemeClr val="lt1"/>
+          </a:fontRef>
+        </p:style>
+        <p:txBody>
+          <a:bodyPr rtlCol="0" anchor="ctr"/>
+          <a:lstStyle/>
+          <a:p>
+            <a:pPr algn="ctr"/>
+            <a:endParaRPr lang="en-US"/>
+          </a:p>
+        </p:txBody>
+      </p:sp>
+      <p:grpSp>
+        <p:nvGrpSpPr>
+          <p:cNvPr id="26" name="Group 25">
+            <a:extLst>
+              <a:ext uri="{FF2B5EF4-FFF2-40B4-BE49-F238E27FC236}">
+                <a16:creationId xmlns:a16="http://schemas.microsoft.com/office/drawing/2014/main" id="{00F957A9-8D17-499C-9DD9-BDD99AA36B9A}"/>
+              </a:ext>
+            </a:extLst>
+          </p:cNvPr>
+          <p:cNvGrpSpPr/>
+          <p:nvPr/>
+        </p:nvGrpSpPr>
+        <p:grpSpPr>
+          <a:xfrm>
+            <a:off x="1577783" y="3970404"/>
+            <a:ext cx="2039219" cy="785998"/>
+            <a:chOff x="1864665" y="4265066"/>
+            <a:chExt cx="2039219" cy="785998"/>
+          </a:xfrm>
+        </p:grpSpPr>
+        <p:sp>
+          <p:nvSpPr>
+            <p:cNvPr id="25" name="Rectangle 24">
+              <a:extLst>
+                <a:ext uri="{FF2B5EF4-FFF2-40B4-BE49-F238E27FC236}">
+                  <a16:creationId xmlns:a16="http://schemas.microsoft.com/office/drawing/2014/main" id="{898F4DFD-61F8-4023-930D-EE9B90E605B0}"/>
+                </a:ext>
+              </a:extLst>
+            </p:cNvPr>
+            <p:cNvSpPr/>
+            <p:nvPr/>
+          </p:nvSpPr>
+          <p:spPr>
+            <a:xfrm rot="21399419">
+              <a:off x="1864665" y="4453949"/>
+              <a:ext cx="2039219" cy="414192"/>
+            </a:xfrm>
+            <a:prstGeom prst="rect">
+              <a:avLst/>
+            </a:prstGeom>
+            <a:solidFill>
+              <a:srgbClr val="4E0AC6">
+                <a:alpha val="70000"/>
+              </a:srgbClr>
+            </a:solidFill>
+            <a:ln>
+              <a:noFill/>
+            </a:ln>
+            <a:effectLst>
+              <a:outerShdw blurRad="50800" dist="38100" dir="2700000" algn="tl" rotWithShape="0">
+                <a:prstClr val="black">
+                  <a:alpha val="40000"/>
+                </a:prstClr>
+              </a:outerShdw>
+            </a:effectLst>
+          </p:spPr>
+          <p:style>
+            <a:lnRef idx="2">
+              <a:schemeClr val="accent1">
+                <a:shade val="50000"/>
+              </a:schemeClr>
+            </a:lnRef>
+            <a:fillRef idx="1">
+              <a:schemeClr val="accent1"/>
+            </a:fillRef>
+            <a:effectRef idx="0">
+              <a:schemeClr val="accent1"/>
+            </a:effectRef>
+            <a:fontRef idx="minor">
+              <a:schemeClr val="lt1"/>
+            </a:fontRef>
+          </p:style>
+          <p:txBody>
+            <a:bodyPr rtlCol="0" anchor="ctr"/>
+            <a:lstStyle/>
+            <a:p>
+              <a:pPr algn="ctr"/>
+              <a:endParaRPr lang="en-US" dirty="0"/>
+            </a:p>
+          </p:txBody>
+        </p:sp>
+        <p:sp>
+          <p:nvSpPr>
+            <p:cNvPr id="6" name="Title 3">
+              <a:extLst>
+                <a:ext uri="{FF2B5EF4-FFF2-40B4-BE49-F238E27FC236}">
+                  <a16:creationId xmlns:a16="http://schemas.microsoft.com/office/drawing/2014/main" id="{5161CD4F-EB36-4723-A777-4ED5FB6B15EF}"/>
+                </a:ext>
+              </a:extLst>
+            </p:cNvPr>
+            <p:cNvSpPr txBox="1">
+              <a:spLocks/>
+            </p:cNvSpPr>
+            <p:nvPr/>
+          </p:nvSpPr>
+          <p:spPr>
+            <a:xfrm>
+              <a:off x="1969960" y="4265066"/>
+              <a:ext cx="1883597" cy="785998"/>
+            </a:xfrm>
+            <a:prstGeom prst="rect">
+              <a:avLst/>
+            </a:prstGeom>
+            <a:effectLst>
+              <a:outerShdw blurRad="50800" dist="38100" dir="2700000" algn="tl" rotWithShape="0">
+                <a:srgbClr val="4E0AC6">
+                  <a:alpha val="80000"/>
+                </a:srgbClr>
+              </a:outerShdw>
+            </a:effectLst>
+          </p:spPr>
+          <p:txBody>
+            <a:bodyPr lIns="0" tIns="0" rIns="0" bIns="0" anchor="ctr">
+              <a:noAutofit/>
+            </a:bodyPr>
+            <a:lstStyle>
+              <a:lvl1pPr algn="l" defTabSz="914355" rtl="0" eaLnBrk="1" latinLnBrk="0" hangingPunct="1">
+                <a:lnSpc>
+                  <a:spcPct val="90000"/>
+                </a:lnSpc>
+                <a:spcBef>
+                  <a:spcPct val="0"/>
+                </a:spcBef>
+                <a:buNone/>
+                <a:defRPr sz="2800" b="0" i="0" kern="1200" spc="0" baseline="0">
+                  <a:solidFill>
+                    <a:schemeClr val="accent2"/>
+                  </a:solidFill>
+                  <a:latin typeface="+mj-lt"/>
+                  <a:ea typeface="+mj-ea"/>
+                  <a:cs typeface="Century Gothic Regular" charset="0"/>
+                </a:defRPr>
+              </a:lvl1pPr>
+            </a:lstStyle>
+            <a:p>
+              <a:pPr>
+                <a:lnSpc>
+                  <a:spcPct val="100000"/>
+                </a:lnSpc>
+              </a:pPr>
+              <a:r>
+                <a:rPr lang="en-GB" sz="1500" spc="120" dirty="0">
+                  <a:solidFill>
+                    <a:schemeClr val="bg1"/>
+                  </a:solidFill>
+                  <a:latin typeface="MarkPro-Bold" panose="020B0804020101010102" pitchFamily="34" charset="0"/>
+                  <a:ea typeface="Inter SemiBold" panose="020B0502030000000004" pitchFamily="34" charset="0"/>
+                  <a:cs typeface="Mark OT Light" charset="0"/>
+                </a:rPr>
+                <a:t>BLOGGING WITH</a:t>
+              </a:r>
+              <a:endParaRPr lang="en-GB" sz="1500" spc="120" dirty="0">
+                <a:solidFill>
+                  <a:schemeClr val="bg1"/>
+                </a:solidFill>
+                <a:latin typeface="MarkPro-Bold" panose="020B0804020101010102" pitchFamily="34" charset="0"/>
+                <a:ea typeface="Segoe UI Black" panose="020B0A02040204020203" pitchFamily="34" charset="0"/>
+                <a:cs typeface="Segoe UI" panose="020B0502040204020203" pitchFamily="34" charset="0"/>
+              </a:endParaRPr>
+            </a:p>
+          </p:txBody>
+        </p:sp>
+      </p:grpSp>
+      <p:grpSp>
+        <p:nvGrpSpPr>
+          <p:cNvPr id="37" name="Group 36">
+            <a:extLst>
+              <a:ext uri="{FF2B5EF4-FFF2-40B4-BE49-F238E27FC236}">
+                <a16:creationId xmlns:a16="http://schemas.microsoft.com/office/drawing/2014/main" id="{912968AE-1A7A-43C1-B782-41E2C71A9B4F}"/>
+              </a:ext>
+            </a:extLst>
+          </p:cNvPr>
+          <p:cNvGrpSpPr/>
+          <p:nvPr/>
+        </p:nvGrpSpPr>
+        <p:grpSpPr>
+          <a:xfrm>
+            <a:off x="336958" y="183393"/>
+            <a:ext cx="2164943" cy="586522"/>
+            <a:chOff x="336958" y="183393"/>
+            <a:chExt cx="2164943" cy="586522"/>
+          </a:xfrm>
+        </p:grpSpPr>
+        <p:sp>
+          <p:nvSpPr>
+            <p:cNvPr id="17" name="Title 3">
+              <a:extLst>
+                <a:ext uri="{FF2B5EF4-FFF2-40B4-BE49-F238E27FC236}">
+                  <a16:creationId xmlns:a16="http://schemas.microsoft.com/office/drawing/2014/main" id="{C81C530D-D835-4A1A-81BE-BE9F0DE02236}"/>
+                </a:ext>
+              </a:extLst>
+            </p:cNvPr>
+            <p:cNvSpPr txBox="1">
+              <a:spLocks/>
+            </p:cNvSpPr>
+            <p:nvPr/>
+          </p:nvSpPr>
+          <p:spPr>
+            <a:xfrm>
+              <a:off x="716267" y="183393"/>
+              <a:ext cx="1785634" cy="586522"/>
+            </a:xfrm>
+            <a:prstGeom prst="rect">
+              <a:avLst/>
+            </a:prstGeom>
+            <a:effectLst>
+              <a:outerShdw blurRad="50800" dist="38100" dir="2700000" algn="tl" rotWithShape="0">
+                <a:prstClr val="black">
+                  <a:alpha val="40000"/>
+                </a:prstClr>
+              </a:outerShdw>
+            </a:effectLst>
+          </p:spPr>
+          <p:txBody>
+            <a:bodyPr lIns="0" tIns="0" rIns="0" bIns="0" anchor="ctr">
+              <a:noAutofit/>
+            </a:bodyPr>
+            <a:lstStyle>
+              <a:lvl1pPr algn="l" defTabSz="914355" rtl="0" eaLnBrk="1" latinLnBrk="0" hangingPunct="1">
+                <a:lnSpc>
+                  <a:spcPct val="90000"/>
+                </a:lnSpc>
+                <a:spcBef>
+                  <a:spcPct val="0"/>
+                </a:spcBef>
+                <a:buNone/>
+                <a:defRPr sz="2800" b="0" i="0" kern="1200" spc="0" baseline="0">
+                  <a:solidFill>
+                    <a:schemeClr val="accent2"/>
+                  </a:solidFill>
+                  <a:latin typeface="+mj-lt"/>
+                  <a:ea typeface="+mj-ea"/>
+                  <a:cs typeface="Century Gothic Regular" charset="0"/>
+                </a:defRPr>
+              </a:lvl1pPr>
+            </a:lstStyle>
+            <a:p>
+              <a:pPr>
+                <a:lnSpc>
+                  <a:spcPct val="100000"/>
+                </a:lnSpc>
+              </a:pPr>
+              <a:r>
+                <a:rPr lang="en-GB" sz="2000" spc="-143" dirty="0">
+                  <a:solidFill>
+                    <a:schemeClr val="bg1"/>
+                  </a:solidFill>
+                  <a:latin typeface="Inter SemiBold" panose="020B0502030000000004" pitchFamily="34" charset="0"/>
+                  <a:ea typeface="Inter SemiBold" panose="020B0502030000000004" pitchFamily="34" charset="0"/>
+                  <a:cs typeface="Mark OT Light" charset="0"/>
+                </a:rPr>
+                <a:t>rakirahman.me</a:t>
+              </a:r>
+            </a:p>
+          </p:txBody>
+        </p:sp>
+        <p:grpSp>
+          <p:nvGrpSpPr>
+            <p:cNvPr id="36" name="Group 35">
+              <a:extLst>
+                <a:ext uri="{FF2B5EF4-FFF2-40B4-BE49-F238E27FC236}">
+                  <a16:creationId xmlns:a16="http://schemas.microsoft.com/office/drawing/2014/main" id="{7BF3B3F5-DAF0-4F2A-B1C5-21D1ABFA0C0F}"/>
+                </a:ext>
+              </a:extLst>
+            </p:cNvPr>
+            <p:cNvGrpSpPr/>
+            <p:nvPr/>
+          </p:nvGrpSpPr>
+          <p:grpSpPr>
+            <a:xfrm>
+              <a:off x="336958" y="313998"/>
+              <a:ext cx="310070" cy="310070"/>
+              <a:chOff x="336958" y="313998"/>
+              <a:chExt cx="310070" cy="310070"/>
+            </a:xfrm>
+          </p:grpSpPr>
+          <p:sp>
+            <p:nvSpPr>
+              <p:cNvPr id="10" name="Oval 9">
+                <a:extLst>
+                  <a:ext uri="{FF2B5EF4-FFF2-40B4-BE49-F238E27FC236}">
+                    <a16:creationId xmlns:a16="http://schemas.microsoft.com/office/drawing/2014/main" id="{9DF77205-F447-474E-B06F-477A11C4D33E}"/>
+                  </a:ext>
+                </a:extLst>
+              </p:cNvPr>
+              <p:cNvSpPr/>
+              <p:nvPr/>
+            </p:nvSpPr>
+            <p:spPr>
+              <a:xfrm>
+                <a:off x="336958" y="313998"/>
+                <a:ext cx="310070" cy="310070"/>
+              </a:xfrm>
+              <a:prstGeom prst="ellipse">
+                <a:avLst/>
+              </a:prstGeom>
+              <a:solidFill>
+                <a:schemeClr val="bg1"/>
+              </a:solidFill>
+              <a:ln>
+                <a:noFill/>
+              </a:ln>
+              <a:effectLst>
+                <a:outerShdw blurRad="50800" dist="38100" dir="2700000" algn="tl" rotWithShape="0">
+                  <a:prstClr val="black">
+                    <a:alpha val="40000"/>
+                  </a:prstClr>
+                </a:outerShdw>
+              </a:effectLst>
+            </p:spPr>
+            <p:style>
+              <a:lnRef idx="2">
+                <a:schemeClr val="accent1">
+                  <a:shade val="50000"/>
+                </a:schemeClr>
+              </a:lnRef>
+              <a:fillRef idx="1">
+                <a:schemeClr val="accent1"/>
+              </a:fillRef>
+              <a:effectRef idx="0">
+                <a:schemeClr val="accent1"/>
+              </a:effectRef>
+              <a:fontRef idx="minor">
+                <a:schemeClr val="lt1"/>
+              </a:fontRef>
+            </p:style>
+            <p:txBody>
+              <a:bodyPr rtlCol="0" anchor="ctr"/>
+              <a:lstStyle/>
+              <a:p>
+                <a:pPr algn="ctr"/>
+                <a:endParaRPr lang="en-US" dirty="0"/>
+              </a:p>
+            </p:txBody>
+          </p:sp>
+          <p:pic>
+            <p:nvPicPr>
+              <p:cNvPr id="35" name="Picture 34">
+                <a:extLst>
+                  <a:ext uri="{FF2B5EF4-FFF2-40B4-BE49-F238E27FC236}">
+                    <a16:creationId xmlns:a16="http://schemas.microsoft.com/office/drawing/2014/main" id="{35CFC7CD-38EF-4FB8-A968-97D0473BA258}"/>
+                  </a:ext>
+                </a:extLst>
+              </p:cNvPr>
+              <p:cNvPicPr>
+                <a:picLocks noChangeAspect="1"/>
+              </p:cNvPicPr>
+              <p:nvPr/>
+            </p:nvPicPr>
+            <p:blipFill>
+              <a:blip r:embed="rId3">
+                <a:extLst>
+                  <a:ext uri="{28A0092B-C50C-407E-A947-70E740481C1C}">
+                    <a14:useLocalDpi xmlns:a14="http://schemas.microsoft.com/office/drawing/2010/main" val="0"/>
+                  </a:ext>
+                </a:extLst>
+              </a:blip>
+              <a:stretch>
+                <a:fillRect/>
+              </a:stretch>
+            </p:blipFill>
+            <p:spPr>
+              <a:xfrm>
+                <a:off x="362920" y="339960"/>
+                <a:ext cx="258147" cy="258147"/>
+              </a:xfrm>
+              <a:prstGeom prst="ellipse">
+                <a:avLst/>
+              </a:prstGeom>
+            </p:spPr>
+          </p:pic>
+        </p:grpSp>
+      </p:grpSp>
+      <p:grpSp>
+        <p:nvGrpSpPr>
+          <p:cNvPr id="30" name="Group 29">
+            <a:extLst>
+              <a:ext uri="{FF2B5EF4-FFF2-40B4-BE49-F238E27FC236}">
+                <a16:creationId xmlns:a16="http://schemas.microsoft.com/office/drawing/2014/main" id="{9D693266-5080-433B-82EC-D471496EE304}"/>
+              </a:ext>
+            </a:extLst>
+          </p:cNvPr>
+          <p:cNvGrpSpPr/>
+          <p:nvPr/>
+        </p:nvGrpSpPr>
+        <p:grpSpPr>
+          <a:xfrm>
+            <a:off x="4440931" y="2298567"/>
+            <a:ext cx="3136122" cy="1265437"/>
+            <a:chOff x="3872607" y="2421472"/>
+            <a:chExt cx="3136122" cy="1265437"/>
+          </a:xfrm>
+        </p:grpSpPr>
+        <p:pic>
+          <p:nvPicPr>
+            <p:cNvPr id="11" name="Picture 10">
+              <a:extLst>
+                <a:ext uri="{FF2B5EF4-FFF2-40B4-BE49-F238E27FC236}">
+                  <a16:creationId xmlns:a16="http://schemas.microsoft.com/office/drawing/2014/main" id="{1A8B075F-5E9E-42A8-B1F7-1ABE24FD1C9F}"/>
+                </a:ext>
+              </a:extLst>
+            </p:cNvPr>
+            <p:cNvPicPr>
+              <a:picLocks noChangeAspect="1"/>
+            </p:cNvPicPr>
+            <p:nvPr/>
+          </p:nvPicPr>
+          <p:blipFill>
+            <a:blip r:embed="rId4">
+              <a:extLst>
+                <a:ext uri="{28A0092B-C50C-407E-A947-70E740481C1C}">
+                  <a14:useLocalDpi xmlns:a14="http://schemas.microsoft.com/office/drawing/2010/main" val="0"/>
+                </a:ext>
+              </a:extLst>
+            </a:blip>
+            <a:stretch>
+              <a:fillRect/>
+            </a:stretch>
+          </p:blipFill>
+          <p:spPr>
+            <a:xfrm>
+              <a:off x="3872607" y="2421472"/>
+              <a:ext cx="1265437" cy="1265437"/>
+            </a:xfrm>
+            <a:prstGeom prst="rect">
+              <a:avLst/>
+            </a:prstGeom>
+            <a:effectLst>
+              <a:outerShdw blurRad="50800" dist="38100" dir="2700000" algn="tl" rotWithShape="0">
+                <a:prstClr val="black">
+                  <a:alpha val="40000"/>
+                </a:prstClr>
+              </a:outerShdw>
+            </a:effectLst>
+          </p:spPr>
+        </p:pic>
+        <p:pic>
+          <p:nvPicPr>
+            <p:cNvPr id="15" name="Picture 14">
+              <a:extLst>
+                <a:ext uri="{FF2B5EF4-FFF2-40B4-BE49-F238E27FC236}">
+                  <a16:creationId xmlns:a16="http://schemas.microsoft.com/office/drawing/2014/main" id="{10535B41-0235-4C67-BF92-2AE7B47D6EC6}"/>
+                </a:ext>
+              </a:extLst>
+            </p:cNvPr>
+            <p:cNvPicPr>
+              <a:picLocks noChangeAspect="1"/>
+            </p:cNvPicPr>
+            <p:nvPr/>
+          </p:nvPicPr>
+          <p:blipFill>
+            <a:blip r:embed="rId5">
+              <a:extLst>
+                <a:ext uri="{28A0092B-C50C-407E-A947-70E740481C1C}">
+                  <a14:useLocalDpi xmlns:a14="http://schemas.microsoft.com/office/drawing/2010/main" val="0"/>
+                </a:ext>
+              </a:extLst>
+            </a:blip>
+            <a:stretch>
+              <a:fillRect/>
+            </a:stretch>
+          </p:blipFill>
+          <p:spPr>
+            <a:xfrm>
+              <a:off x="5520039" y="2421472"/>
+              <a:ext cx="1488690" cy="1156217"/>
+            </a:xfrm>
+            <a:prstGeom prst="rect">
+              <a:avLst/>
+            </a:prstGeom>
+            <a:effectLst>
+              <a:outerShdw blurRad="50800" dist="38100" dir="2700000" algn="tl" rotWithShape="0">
+                <a:prstClr val="black">
+                  <a:alpha val="40000"/>
+                </a:prstClr>
+              </a:outerShdw>
+            </a:effectLst>
+          </p:spPr>
+        </p:pic>
+      </p:grpSp>
+      <p:grpSp>
+        <p:nvGrpSpPr>
+          <p:cNvPr id="28" name="Group 27">
+            <a:extLst>
+              <a:ext uri="{FF2B5EF4-FFF2-40B4-BE49-F238E27FC236}">
+                <a16:creationId xmlns:a16="http://schemas.microsoft.com/office/drawing/2014/main" id="{79F3B0B9-ABD4-42C1-B220-0A65009F8D72}"/>
+              </a:ext>
+            </a:extLst>
+          </p:cNvPr>
+          <p:cNvGrpSpPr/>
+          <p:nvPr/>
+        </p:nvGrpSpPr>
+        <p:grpSpPr>
+          <a:xfrm>
+            <a:off x="2812811" y="4371115"/>
+            <a:ext cx="6626705" cy="1265437"/>
+            <a:chOff x="2618259" y="4371115"/>
+            <a:chExt cx="6626705" cy="1265437"/>
+          </a:xfrm>
+        </p:grpSpPr>
+        <p:pic>
+          <p:nvPicPr>
+            <p:cNvPr id="20" name="Picture 19">
+              <a:extLst>
+                <a:ext uri="{FF2B5EF4-FFF2-40B4-BE49-F238E27FC236}">
+                  <a16:creationId xmlns:a16="http://schemas.microsoft.com/office/drawing/2014/main" id="{5992F3DB-08AD-44B4-84F8-CE0DCEB683B8}"/>
+                </a:ext>
+              </a:extLst>
+            </p:cNvPr>
+            <p:cNvPicPr>
+              <a:picLocks noChangeAspect="1"/>
+            </p:cNvPicPr>
+            <p:nvPr/>
+          </p:nvPicPr>
+          <p:blipFill rotWithShape="1">
+            <a:blip r:embed="rId6">
+              <a:extLst>
+                <a:ext uri="{28A0092B-C50C-407E-A947-70E740481C1C}">
+                  <a14:useLocalDpi xmlns:a14="http://schemas.microsoft.com/office/drawing/2010/main" val="0"/>
+                </a:ext>
+              </a:extLst>
+            </a:blip>
+            <a:srcRect l="35294"/>
+            <a:stretch/>
+          </p:blipFill>
+          <p:spPr>
+            <a:xfrm>
+              <a:off x="2618259" y="4371115"/>
+              <a:ext cx="2950673" cy="1265437"/>
+            </a:xfrm>
+            <a:prstGeom prst="rect">
+              <a:avLst/>
+            </a:prstGeom>
+            <a:effectLst>
+              <a:outerShdw blurRad="50800" dist="38100" dir="2700000" algn="tl" rotWithShape="0">
+                <a:prstClr val="black">
+                  <a:alpha val="40000"/>
+                </a:prstClr>
+              </a:outerShdw>
+            </a:effectLst>
+          </p:spPr>
+        </p:pic>
+        <p:sp>
+          <p:nvSpPr>
+            <p:cNvPr id="27" name="TextBox 26">
+              <a:extLst>
+                <a:ext uri="{FF2B5EF4-FFF2-40B4-BE49-F238E27FC236}">
+                  <a16:creationId xmlns:a16="http://schemas.microsoft.com/office/drawing/2014/main" id="{07EC0098-84CD-4435-AC26-721018F9CC00}"/>
+                </a:ext>
+              </a:extLst>
+            </p:cNvPr>
+            <p:cNvSpPr txBox="1"/>
+            <p:nvPr/>
+          </p:nvSpPr>
+          <p:spPr>
+            <a:xfrm>
+              <a:off x="5520039" y="4467001"/>
+              <a:ext cx="3724925" cy="1169551"/>
+            </a:xfrm>
+            <a:prstGeom prst="rect">
+              <a:avLst/>
+            </a:prstGeom>
+            <a:noFill/>
+            <a:effectLst>
+              <a:outerShdw blurRad="50800" dist="38100" dir="2700000" algn="tl" rotWithShape="0">
+                <a:prstClr val="black">
+                  <a:alpha val="40000"/>
+                </a:prstClr>
+              </a:outerShdw>
+            </a:effectLst>
+          </p:spPr>
+          <p:txBody>
+            <a:bodyPr wrap="square">
+              <a:spAutoFit/>
+            </a:bodyPr>
+            <a:lstStyle/>
+            <a:p>
+              <a:pPr>
+                <a:lnSpc>
+                  <a:spcPct val="100000"/>
+                </a:lnSpc>
+              </a:pPr>
+              <a:r>
+                <a:rPr lang="en-GB" sz="7000" spc="-143" dirty="0">
+                  <a:solidFill>
+                    <a:srgbClr val="4F5C62"/>
+                  </a:solidFill>
+                  <a:latin typeface="MarkPro" panose="020B0504020101010102" pitchFamily="34" charset="0"/>
+                  <a:ea typeface="Inter" panose="020B0502030000000004" pitchFamily="34" charset="0"/>
+                  <a:cs typeface="Mark OT Light" charset="0"/>
+                </a:rPr>
+                <a:t>on</a:t>
+              </a:r>
+              <a:r>
+                <a:rPr lang="en-GB" sz="7000" spc="-143" dirty="0">
+                  <a:solidFill>
+                    <a:srgbClr val="4F5C62"/>
+                  </a:solidFill>
+                  <a:latin typeface="Inter SemiBold" panose="020B0502030000000004" pitchFamily="34" charset="0"/>
+                  <a:ea typeface="Inter SemiBold" panose="020B0502030000000004" pitchFamily="34" charset="0"/>
+                  <a:cs typeface="Mark OT Light" charset="0"/>
+                </a:rPr>
+                <a:t> </a:t>
+              </a:r>
+              <a:r>
+                <a:rPr lang="en-GB" sz="7000" spc="-143" dirty="0">
+                  <a:solidFill>
+                    <a:srgbClr val="0395C8"/>
+                  </a:solidFill>
+                  <a:latin typeface="Segoe UI" panose="020B0502040204020203" pitchFamily="34" charset="0"/>
+                  <a:ea typeface="Inter SemiBold" panose="020B0502030000000004" pitchFamily="34" charset="0"/>
+                  <a:cs typeface="Segoe UI" panose="020B0502040204020203" pitchFamily="34" charset="0"/>
+                </a:rPr>
+                <a:t>Azure</a:t>
+              </a:r>
+              <a:endParaRPr lang="en-GB" sz="7000" spc="-143" dirty="0">
+                <a:solidFill>
+                  <a:srgbClr val="4F5C62"/>
+                </a:solidFill>
+                <a:latin typeface="Segoe UI" panose="020B0502040204020203" pitchFamily="34" charset="0"/>
+                <a:ea typeface="Segoe UI Black" panose="020B0A02040204020203" pitchFamily="34" charset="0"/>
+                <a:cs typeface="Segoe UI" panose="020B0502040204020203" pitchFamily="34" charset="0"/>
+              </a:endParaRPr>
+            </a:p>
+          </p:txBody>
+        </p:sp>
+      </p:grpSp>
+    </p:spTree>
+    <p:extLst>
+      <p:ext uri="{BB962C8B-B14F-4D97-AF65-F5344CB8AC3E}">
+        <p14:creationId xmlns:p14="http://schemas.microsoft.com/office/powerpoint/2010/main" val="3890645462"/>
+      </p:ext>
+    </p:extLst>
+  </p:cSld>
+  <p:clrMapOvr>
+    <a:masterClrMapping/>
+  </p:clrMapOvr>
+</p:sld>
+</file>
+
 <file path=ppt/theme/theme1.xml><?xml version="1.0" encoding="utf-8"?>
 <a:theme xmlns:a="http://schemas.openxmlformats.org/drawingml/2006/main" name="Office Theme">
   <a:themeElements>

</xml_diff>

<commit_message>
Slight updates to og header
</commit_message>
<xml_diff>
--- a/src/assets/graphics/PPT/post-headers.pptx
+++ b/src/assets/graphics/PPT/post-headers.pptx
@@ -8,6 +8,7 @@
     <p:sldId id="271" r:id="rId2"/>
     <p:sldId id="274" r:id="rId3"/>
     <p:sldId id="275" r:id="rId4"/>
+    <p:sldId id="276" r:id="rId5"/>
   </p:sldIdLst>
   <p:sldSz cx="12252325" cy="5999163"/>
   <p:notesSz cx="6858000" cy="9144000"/>
@@ -5479,6 +5480,450 @@
 </p:sld>
 </file>
 
+<file path=ppt/slides/slide4.xml><?xml version="1.0" encoding="utf-8"?>
+<p:sld xmlns:a="http://schemas.openxmlformats.org/drawingml/2006/main" xmlns:r="http://schemas.openxmlformats.org/officeDocument/2006/relationships" xmlns:p="http://schemas.openxmlformats.org/presentationml/2006/main">
+  <p:cSld>
+    <p:spTree>
+      <p:nvGrpSpPr>
+        <p:cNvPr id="1" name=""/>
+        <p:cNvGrpSpPr/>
+        <p:nvPr/>
+      </p:nvGrpSpPr>
+      <p:grpSpPr>
+        <a:xfrm>
+          <a:off x="0" y="0"/>
+          <a:ext cx="0" cy="0"/>
+          <a:chOff x="0" y="0"/>
+          <a:chExt cx="0" cy="0"/>
+        </a:xfrm>
+      </p:grpSpPr>
+      <p:sp>
+        <p:nvSpPr>
+          <p:cNvPr id="4" name="Rectangle 3">
+            <a:extLst>
+              <a:ext uri="{FF2B5EF4-FFF2-40B4-BE49-F238E27FC236}">
+                <a16:creationId xmlns:a16="http://schemas.microsoft.com/office/drawing/2014/main" id="{9353C309-3FC3-4DEF-8B9A-A5B291605C03}"/>
+              </a:ext>
+            </a:extLst>
+          </p:cNvPr>
+          <p:cNvSpPr/>
+          <p:nvPr/>
+        </p:nvSpPr>
+        <p:spPr>
+          <a:xfrm>
+            <a:off x="-1" y="5189220"/>
+            <a:ext cx="12252326" cy="818408"/>
+          </a:xfrm>
+          <a:prstGeom prst="rect">
+            <a:avLst/>
+          </a:prstGeom>
+          <a:solidFill>
+            <a:srgbClr val="000000"/>
+          </a:solidFill>
+          <a:ln>
+            <a:noFill/>
+          </a:ln>
+        </p:spPr>
+        <p:style>
+          <a:lnRef idx="2">
+            <a:schemeClr val="accent1">
+              <a:shade val="50000"/>
+            </a:schemeClr>
+          </a:lnRef>
+          <a:fillRef idx="1">
+            <a:schemeClr val="accent1"/>
+          </a:fillRef>
+          <a:effectRef idx="0">
+            <a:schemeClr val="accent1"/>
+          </a:effectRef>
+          <a:fontRef idx="minor">
+            <a:schemeClr val="lt1"/>
+          </a:fontRef>
+        </p:style>
+        <p:txBody>
+          <a:bodyPr rot="0" spcFirstLastPara="0" vertOverflow="overflow" horzOverflow="overflow" vert="horz" wrap="square" lIns="98019" tIns="49009" rIns="98019" bIns="49009" numCol="1" spcCol="0" rtlCol="0" fromWordArt="0" anchor="ctr" anchorCtr="0" forceAA="0" compatLnSpc="1">
+            <a:prstTxWarp prst="textNoShape">
+              <a:avLst/>
+            </a:prstTxWarp>
+            <a:noAutofit/>
+          </a:bodyPr>
+          <a:lstStyle/>
+          <a:p>
+            <a:pPr algn="ctr"/>
+            <a:endParaRPr lang="en-US" sz="1929" dirty="0"/>
+          </a:p>
+        </p:txBody>
+      </p:sp>
+      <p:sp>
+        <p:nvSpPr>
+          <p:cNvPr id="33" name="Rectangle 32">
+            <a:extLst>
+              <a:ext uri="{FF2B5EF4-FFF2-40B4-BE49-F238E27FC236}">
+                <a16:creationId xmlns:a16="http://schemas.microsoft.com/office/drawing/2014/main" id="{D212AD04-7306-4CFA-9113-EC8CC98B158E}"/>
+              </a:ext>
+            </a:extLst>
+          </p:cNvPr>
+          <p:cNvSpPr/>
+          <p:nvPr/>
+        </p:nvSpPr>
+        <p:spPr>
+          <a:xfrm>
+            <a:off x="0" y="0"/>
+            <a:ext cx="6126162" cy="5189220"/>
+          </a:xfrm>
+          <a:prstGeom prst="rect">
+            <a:avLst/>
+          </a:prstGeom>
+          <a:solidFill>
+            <a:srgbClr val="F9DEF9"/>
+          </a:solidFill>
+          <a:ln>
+            <a:noFill/>
+          </a:ln>
+        </p:spPr>
+        <p:style>
+          <a:lnRef idx="2">
+            <a:schemeClr val="accent1">
+              <a:shade val="50000"/>
+            </a:schemeClr>
+          </a:lnRef>
+          <a:fillRef idx="1">
+            <a:schemeClr val="accent1"/>
+          </a:fillRef>
+          <a:effectRef idx="0">
+            <a:schemeClr val="accent1"/>
+          </a:effectRef>
+          <a:fontRef idx="minor">
+            <a:schemeClr val="lt1"/>
+          </a:fontRef>
+        </p:style>
+        <p:txBody>
+          <a:bodyPr rot="0" spcFirstLastPara="0" vertOverflow="overflow" horzOverflow="overflow" vert="horz" wrap="square" lIns="98019" tIns="49009" rIns="98019" bIns="49009" numCol="1" spcCol="0" rtlCol="0" fromWordArt="0" anchor="ctr" anchorCtr="0" forceAA="0" compatLnSpc="1">
+            <a:prstTxWarp prst="textNoShape">
+              <a:avLst/>
+            </a:prstTxWarp>
+            <a:noAutofit/>
+          </a:bodyPr>
+          <a:lstStyle/>
+          <a:p>
+            <a:pPr algn="ctr"/>
+            <a:endParaRPr lang="en-US" sz="1929" dirty="0"/>
+          </a:p>
+        </p:txBody>
+      </p:sp>
+      <p:pic>
+        <p:nvPicPr>
+          <p:cNvPr id="3" name="Picture 2">
+            <a:extLst>
+              <a:ext uri="{FF2B5EF4-FFF2-40B4-BE49-F238E27FC236}">
+                <a16:creationId xmlns:a16="http://schemas.microsoft.com/office/drawing/2014/main" id="{3F11F7AB-D839-4B47-802D-D71350B1E684}"/>
+              </a:ext>
+            </a:extLst>
+          </p:cNvPr>
+          <p:cNvPicPr>
+            <a:picLocks noChangeAspect="1"/>
+          </p:cNvPicPr>
+          <p:nvPr/>
+        </p:nvPicPr>
+        <p:blipFill rotWithShape="1">
+          <a:blip r:embed="rId2">
+            <a:extLst>
+              <a:ext uri="{28A0092B-C50C-407E-A947-70E740481C1C}">
+                <a14:useLocalDpi xmlns:a14="http://schemas.microsoft.com/office/drawing/2010/main" val="0"/>
+              </a:ext>
+            </a:extLst>
+          </a:blip>
+          <a:srcRect l="506" r="543"/>
+          <a:stretch/>
+        </p:blipFill>
+        <p:spPr>
+          <a:xfrm>
+            <a:off x="548640" y="0"/>
+            <a:ext cx="11094720" cy="6007626"/>
+          </a:xfrm>
+          <a:prstGeom prst="rect">
+            <a:avLst/>
+          </a:prstGeom>
+        </p:spPr>
+      </p:pic>
+      <p:grpSp>
+        <p:nvGrpSpPr>
+          <p:cNvPr id="37" name="Group 36">
+            <a:extLst>
+              <a:ext uri="{FF2B5EF4-FFF2-40B4-BE49-F238E27FC236}">
+                <a16:creationId xmlns:a16="http://schemas.microsoft.com/office/drawing/2014/main" id="{912968AE-1A7A-43C1-B782-41E2C71A9B4F}"/>
+              </a:ext>
+            </a:extLst>
+          </p:cNvPr>
+          <p:cNvGrpSpPr/>
+          <p:nvPr/>
+        </p:nvGrpSpPr>
+        <p:grpSpPr>
+          <a:xfrm>
+            <a:off x="336958" y="183393"/>
+            <a:ext cx="2164943" cy="586522"/>
+            <a:chOff x="336958" y="183393"/>
+            <a:chExt cx="2164943" cy="586522"/>
+          </a:xfrm>
+        </p:grpSpPr>
+        <p:sp>
+          <p:nvSpPr>
+            <p:cNvPr id="17" name="Title 3">
+              <a:extLst>
+                <a:ext uri="{FF2B5EF4-FFF2-40B4-BE49-F238E27FC236}">
+                  <a16:creationId xmlns:a16="http://schemas.microsoft.com/office/drawing/2014/main" id="{C81C530D-D835-4A1A-81BE-BE9F0DE02236}"/>
+                </a:ext>
+              </a:extLst>
+            </p:cNvPr>
+            <p:cNvSpPr txBox="1">
+              <a:spLocks/>
+            </p:cNvSpPr>
+            <p:nvPr/>
+          </p:nvSpPr>
+          <p:spPr>
+            <a:xfrm>
+              <a:off x="716267" y="183393"/>
+              <a:ext cx="1785634" cy="586522"/>
+            </a:xfrm>
+            <a:prstGeom prst="rect">
+              <a:avLst/>
+            </a:prstGeom>
+            <a:effectLst>
+              <a:outerShdw blurRad="63500" sx="102000" sy="102000" algn="ctr" rotWithShape="0">
+                <a:prstClr val="black">
+                  <a:alpha val="40000"/>
+                </a:prstClr>
+              </a:outerShdw>
+            </a:effectLst>
+          </p:spPr>
+          <p:txBody>
+            <a:bodyPr lIns="0" tIns="0" rIns="0" bIns="0" anchor="ctr">
+              <a:noAutofit/>
+            </a:bodyPr>
+            <a:lstStyle>
+              <a:lvl1pPr algn="l" defTabSz="914355" rtl="0" eaLnBrk="1" latinLnBrk="0" hangingPunct="1">
+                <a:lnSpc>
+                  <a:spcPct val="90000"/>
+                </a:lnSpc>
+                <a:spcBef>
+                  <a:spcPct val="0"/>
+                </a:spcBef>
+                <a:buNone/>
+                <a:defRPr sz="2800" b="0" i="0" kern="1200" spc="0" baseline="0">
+                  <a:solidFill>
+                    <a:schemeClr val="accent2"/>
+                  </a:solidFill>
+                  <a:latin typeface="+mj-lt"/>
+                  <a:ea typeface="+mj-ea"/>
+                  <a:cs typeface="Century Gothic Regular" charset="0"/>
+                </a:defRPr>
+              </a:lvl1pPr>
+            </a:lstStyle>
+            <a:p>
+              <a:pPr>
+                <a:lnSpc>
+                  <a:spcPct val="100000"/>
+                </a:lnSpc>
+              </a:pPr>
+              <a:r>
+                <a:rPr lang="en-GB" sz="2000" spc="-143" dirty="0">
+                  <a:solidFill>
+                    <a:srgbClr val="AE41A7"/>
+                  </a:solidFill>
+                  <a:latin typeface="Inter SemiBold" panose="020B0502030000000004" pitchFamily="34" charset="0"/>
+                  <a:ea typeface="Inter SemiBold" panose="020B0502030000000004" pitchFamily="34" charset="0"/>
+                  <a:cs typeface="Mark OT Light" charset="0"/>
+                </a:rPr>
+                <a:t>rakirahman</a:t>
+              </a:r>
+              <a:r>
+                <a:rPr lang="en-GB" sz="2000" spc="-143" dirty="0">
+                  <a:solidFill>
+                    <a:srgbClr val="000000"/>
+                  </a:solidFill>
+                  <a:latin typeface="Inter SemiBold" panose="020B0502030000000004" pitchFamily="34" charset="0"/>
+                  <a:ea typeface="Inter SemiBold" panose="020B0502030000000004" pitchFamily="34" charset="0"/>
+                  <a:cs typeface="Mark OT Light" charset="0"/>
+                </a:rPr>
+                <a:t>.me</a:t>
+              </a:r>
+            </a:p>
+          </p:txBody>
+        </p:sp>
+        <p:grpSp>
+          <p:nvGrpSpPr>
+            <p:cNvPr id="36" name="Group 35">
+              <a:extLst>
+                <a:ext uri="{FF2B5EF4-FFF2-40B4-BE49-F238E27FC236}">
+                  <a16:creationId xmlns:a16="http://schemas.microsoft.com/office/drawing/2014/main" id="{7BF3B3F5-DAF0-4F2A-B1C5-21D1ABFA0C0F}"/>
+                </a:ext>
+              </a:extLst>
+            </p:cNvPr>
+            <p:cNvGrpSpPr/>
+            <p:nvPr/>
+          </p:nvGrpSpPr>
+          <p:grpSpPr>
+            <a:xfrm>
+              <a:off x="336958" y="313998"/>
+              <a:ext cx="310070" cy="310070"/>
+              <a:chOff x="336958" y="313998"/>
+              <a:chExt cx="310070" cy="310070"/>
+            </a:xfrm>
+          </p:grpSpPr>
+          <p:sp>
+            <p:nvSpPr>
+              <p:cNvPr id="10" name="Oval 9">
+                <a:extLst>
+                  <a:ext uri="{FF2B5EF4-FFF2-40B4-BE49-F238E27FC236}">
+                    <a16:creationId xmlns:a16="http://schemas.microsoft.com/office/drawing/2014/main" id="{9DF77205-F447-474E-B06F-477A11C4D33E}"/>
+                  </a:ext>
+                </a:extLst>
+              </p:cNvPr>
+              <p:cNvSpPr/>
+              <p:nvPr/>
+            </p:nvSpPr>
+            <p:spPr>
+              <a:xfrm>
+                <a:off x="336958" y="313998"/>
+                <a:ext cx="310070" cy="310070"/>
+              </a:xfrm>
+              <a:prstGeom prst="ellipse">
+                <a:avLst/>
+              </a:prstGeom>
+              <a:solidFill>
+                <a:srgbClr val="AE41A7"/>
+              </a:solidFill>
+              <a:ln>
+                <a:noFill/>
+              </a:ln>
+              <a:effectLst>
+                <a:outerShdw blurRad="50800" dist="38100" dir="2700000" algn="tl" rotWithShape="0">
+                  <a:prstClr val="black">
+                    <a:alpha val="40000"/>
+                  </a:prstClr>
+                </a:outerShdw>
+              </a:effectLst>
+            </p:spPr>
+            <p:style>
+              <a:lnRef idx="2">
+                <a:schemeClr val="accent1">
+                  <a:shade val="50000"/>
+                </a:schemeClr>
+              </a:lnRef>
+              <a:fillRef idx="1">
+                <a:schemeClr val="accent1"/>
+              </a:fillRef>
+              <a:effectRef idx="0">
+                <a:schemeClr val="accent1"/>
+              </a:effectRef>
+              <a:fontRef idx="minor">
+                <a:schemeClr val="lt1"/>
+              </a:fontRef>
+            </p:style>
+            <p:txBody>
+              <a:bodyPr rtlCol="0" anchor="ctr"/>
+              <a:lstStyle/>
+              <a:p>
+                <a:pPr algn="ctr"/>
+                <a:endParaRPr lang="en-US"/>
+              </a:p>
+            </p:txBody>
+          </p:sp>
+          <p:pic>
+            <p:nvPicPr>
+              <p:cNvPr id="35" name="Picture 34">
+                <a:extLst>
+                  <a:ext uri="{FF2B5EF4-FFF2-40B4-BE49-F238E27FC236}">
+                    <a16:creationId xmlns:a16="http://schemas.microsoft.com/office/drawing/2014/main" id="{35CFC7CD-38EF-4FB8-A968-97D0473BA258}"/>
+                  </a:ext>
+                </a:extLst>
+              </p:cNvPr>
+              <p:cNvPicPr>
+                <a:picLocks noChangeAspect="1"/>
+              </p:cNvPicPr>
+              <p:nvPr/>
+            </p:nvPicPr>
+            <p:blipFill>
+              <a:blip r:embed="rId3">
+                <a:extLst>
+                  <a:ext uri="{28A0092B-C50C-407E-A947-70E740481C1C}">
+                    <a14:useLocalDpi xmlns:a14="http://schemas.microsoft.com/office/drawing/2010/main" val="0"/>
+                  </a:ext>
+                </a:extLst>
+              </a:blip>
+              <a:stretch>
+                <a:fillRect/>
+              </a:stretch>
+            </p:blipFill>
+            <p:spPr>
+              <a:xfrm>
+                <a:off x="362920" y="339960"/>
+                <a:ext cx="258147" cy="258147"/>
+              </a:xfrm>
+              <a:prstGeom prst="ellipse">
+                <a:avLst/>
+              </a:prstGeom>
+              <a:solidFill>
+                <a:srgbClr val="AE41A7"/>
+              </a:solidFill>
+            </p:spPr>
+          </p:pic>
+        </p:grpSp>
+      </p:grpSp>
+      <p:cxnSp>
+        <p:nvCxnSpPr>
+          <p:cNvPr id="7" name="Straight Connector 6">
+            <a:extLst>
+              <a:ext uri="{FF2B5EF4-FFF2-40B4-BE49-F238E27FC236}">
+                <a16:creationId xmlns:a16="http://schemas.microsoft.com/office/drawing/2014/main" id="{335105ED-3D10-40EB-A264-782CF115E5AD}"/>
+              </a:ext>
+            </a:extLst>
+          </p:cNvPr>
+          <p:cNvCxnSpPr/>
+          <p:nvPr/>
+        </p:nvCxnSpPr>
+        <p:spPr>
+          <a:xfrm>
+            <a:off x="0" y="5189220"/>
+            <a:ext cx="12252325" cy="0"/>
+          </a:xfrm>
+          <a:prstGeom prst="line">
+            <a:avLst/>
+          </a:prstGeom>
+          <a:ln>
+            <a:solidFill>
+              <a:schemeClr val="bg1"/>
+            </a:solidFill>
+          </a:ln>
+        </p:spPr>
+        <p:style>
+          <a:lnRef idx="1">
+            <a:schemeClr val="accent1"/>
+          </a:lnRef>
+          <a:fillRef idx="0">
+            <a:schemeClr val="accent1"/>
+          </a:fillRef>
+          <a:effectRef idx="0">
+            <a:schemeClr val="accent1"/>
+          </a:effectRef>
+          <a:fontRef idx="minor">
+            <a:schemeClr val="tx1"/>
+          </a:fontRef>
+        </p:style>
+      </p:cxnSp>
+    </p:spTree>
+    <p:extLst>
+      <p:ext uri="{BB962C8B-B14F-4D97-AF65-F5344CB8AC3E}">
+        <p14:creationId xmlns:p14="http://schemas.microsoft.com/office/powerpoint/2010/main" val="659526555"/>
+      </p:ext>
+    </p:extLst>
+  </p:cSld>
+  <p:clrMapOvr>
+    <a:masterClrMapping/>
+  </p:clrMapOvr>
+</p:sld>
+</file>
+
 <file path=ppt/theme/theme1.xml><?xml version="1.0" encoding="utf-8"?>
 <a:theme xmlns:a="http://schemas.openxmlformats.org/drawingml/2006/main" name="Office Theme">
   <a:themeElements>

</xml_diff>

<commit_message>
Added new blog post
</commit_message>
<xml_diff>
--- a/src/assets/graphics/PPT/post-headers.pptx
+++ b/src/assets/graphics/PPT/post-headers.pptx
@@ -9,6 +9,8 @@
     <p:sldId id="274" r:id="rId3"/>
     <p:sldId id="275" r:id="rId4"/>
     <p:sldId id="276" r:id="rId5"/>
+    <p:sldId id="277" r:id="rId6"/>
+    <p:sldId id="278" r:id="rId7"/>
   </p:sldIdLst>
   <p:sldSz cx="12252325" cy="5999163"/>
   <p:notesSz cx="6858000" cy="9144000"/>
@@ -1041,7 +1043,7 @@
           <a:p>
             <a:fld id="{188B2B68-3432-42CC-A797-1383801DFB53}" type="datetimeFigureOut">
               <a:rPr lang="en-US" smtClean="0"/>
-              <a:t>10/8/2020</a:t>
+              <a:t>10/12/2020</a:t>
             </a:fld>
             <a:endParaRPr lang="en-US"/>
           </a:p>
@@ -1211,7 +1213,7 @@
           <a:p>
             <a:fld id="{188B2B68-3432-42CC-A797-1383801DFB53}" type="datetimeFigureOut">
               <a:rPr lang="en-US" smtClean="0"/>
-              <a:t>10/8/2020</a:t>
+              <a:t>10/12/2020</a:t>
             </a:fld>
             <a:endParaRPr lang="en-US"/>
           </a:p>
@@ -1391,7 +1393,7 @@
           <a:p>
             <a:fld id="{188B2B68-3432-42CC-A797-1383801DFB53}" type="datetimeFigureOut">
               <a:rPr lang="en-US" smtClean="0"/>
-              <a:t>10/8/2020</a:t>
+              <a:t>10/12/2020</a:t>
             </a:fld>
             <a:endParaRPr lang="en-US"/>
           </a:p>
@@ -1561,7 +1563,7 @@
           <a:p>
             <a:fld id="{188B2B68-3432-42CC-A797-1383801DFB53}" type="datetimeFigureOut">
               <a:rPr lang="en-US" smtClean="0"/>
-              <a:t>10/8/2020</a:t>
+              <a:t>10/12/2020</a:t>
             </a:fld>
             <a:endParaRPr lang="en-US"/>
           </a:p>
@@ -1807,7 +1809,7 @@
           <a:p>
             <a:fld id="{188B2B68-3432-42CC-A797-1383801DFB53}" type="datetimeFigureOut">
               <a:rPr lang="en-US" smtClean="0"/>
-              <a:t>10/8/2020</a:t>
+              <a:t>10/12/2020</a:t>
             </a:fld>
             <a:endParaRPr lang="en-US"/>
           </a:p>
@@ -2039,7 +2041,7 @@
           <a:p>
             <a:fld id="{188B2B68-3432-42CC-A797-1383801DFB53}" type="datetimeFigureOut">
               <a:rPr lang="en-US" smtClean="0"/>
-              <a:t>10/8/2020</a:t>
+              <a:t>10/12/2020</a:t>
             </a:fld>
             <a:endParaRPr lang="en-US"/>
           </a:p>
@@ -2406,7 +2408,7 @@
           <a:p>
             <a:fld id="{188B2B68-3432-42CC-A797-1383801DFB53}" type="datetimeFigureOut">
               <a:rPr lang="en-US" smtClean="0"/>
-              <a:t>10/8/2020</a:t>
+              <a:t>10/12/2020</a:t>
             </a:fld>
             <a:endParaRPr lang="en-US"/>
           </a:p>
@@ -2524,7 +2526,7 @@
           <a:p>
             <a:fld id="{188B2B68-3432-42CC-A797-1383801DFB53}" type="datetimeFigureOut">
               <a:rPr lang="en-US" smtClean="0"/>
-              <a:t>10/8/2020</a:t>
+              <a:t>10/12/2020</a:t>
             </a:fld>
             <a:endParaRPr lang="en-US"/>
           </a:p>
@@ -2619,7 +2621,7 @@
           <a:p>
             <a:fld id="{188B2B68-3432-42CC-A797-1383801DFB53}" type="datetimeFigureOut">
               <a:rPr lang="en-US" smtClean="0"/>
-              <a:t>10/8/2020</a:t>
+              <a:t>10/12/2020</a:t>
             </a:fld>
             <a:endParaRPr lang="en-US"/>
           </a:p>
@@ -2896,7 +2898,7 @@
           <a:p>
             <a:fld id="{188B2B68-3432-42CC-A797-1383801DFB53}" type="datetimeFigureOut">
               <a:rPr lang="en-US" smtClean="0"/>
-              <a:t>10/8/2020</a:t>
+              <a:t>10/12/2020</a:t>
             </a:fld>
             <a:endParaRPr lang="en-US"/>
           </a:p>
@@ -3153,7 +3155,7 @@
           <a:p>
             <a:fld id="{188B2B68-3432-42CC-A797-1383801DFB53}" type="datetimeFigureOut">
               <a:rPr lang="en-US" smtClean="0"/>
-              <a:t>10/8/2020</a:t>
+              <a:t>10/12/2020</a:t>
             </a:fld>
             <a:endParaRPr lang="en-US"/>
           </a:p>
@@ -3366,7 +3368,7 @@
           <a:p>
             <a:fld id="{188B2B68-3432-42CC-A797-1383801DFB53}" type="datetimeFigureOut">
               <a:rPr lang="en-US" smtClean="0"/>
-              <a:t>10/8/2020</a:t>
+              <a:t>10/12/2020</a:t>
             </a:fld>
             <a:endParaRPr lang="en-US"/>
           </a:p>
@@ -5924,6 +5926,1380 @@
 </p:sld>
 </file>
 
+<file path=ppt/slides/slide5.xml><?xml version="1.0" encoding="utf-8"?>
+<p:sld xmlns:a="http://schemas.openxmlformats.org/drawingml/2006/main" xmlns:r="http://schemas.openxmlformats.org/officeDocument/2006/relationships" xmlns:p="http://schemas.openxmlformats.org/presentationml/2006/main">
+  <p:cSld>
+    <p:spTree>
+      <p:nvGrpSpPr>
+        <p:cNvPr id="1" name=""/>
+        <p:cNvGrpSpPr/>
+        <p:nvPr/>
+      </p:nvGrpSpPr>
+      <p:grpSpPr>
+        <a:xfrm>
+          <a:off x="0" y="0"/>
+          <a:ext cx="0" cy="0"/>
+          <a:chOff x="0" y="0"/>
+          <a:chExt cx="0" cy="0"/>
+        </a:xfrm>
+      </p:grpSpPr>
+      <p:pic>
+        <p:nvPicPr>
+          <p:cNvPr id="16" name="Graphic 15">
+            <a:extLst>
+              <a:ext uri="{FF2B5EF4-FFF2-40B4-BE49-F238E27FC236}">
+                <a16:creationId xmlns:a16="http://schemas.microsoft.com/office/drawing/2014/main" id="{3314DD05-E841-4158-8982-E436D37DCE6D}"/>
+              </a:ext>
+            </a:extLst>
+          </p:cNvPr>
+          <p:cNvPicPr>
+            <a:picLocks noChangeAspect="1"/>
+          </p:cNvPicPr>
+          <p:nvPr/>
+        </p:nvPicPr>
+        <p:blipFill>
+          <a:blip r:embed="rId2">
+            <a:extLst>
+              <a:ext uri="{96DAC541-7B7A-43D3-8B79-37D633B846F1}">
+                <asvg:svgBlip xmlns:asvg="http://schemas.microsoft.com/office/drawing/2016/SVG/main" r:embed="rId3"/>
+              </a:ext>
+            </a:extLst>
+          </a:blip>
+          <a:stretch>
+            <a:fillRect/>
+          </a:stretch>
+        </p:blipFill>
+        <p:spPr>
+          <a:xfrm>
+            <a:off x="-1" y="0"/>
+            <a:ext cx="12252325" cy="5999162"/>
+          </a:xfrm>
+          <a:prstGeom prst="rect">
+            <a:avLst/>
+          </a:prstGeom>
+        </p:spPr>
+      </p:pic>
+      <p:pic>
+        <p:nvPicPr>
+          <p:cNvPr id="30" name="Graphic 29">
+            <a:extLst>
+              <a:ext uri="{FF2B5EF4-FFF2-40B4-BE49-F238E27FC236}">
+                <a16:creationId xmlns:a16="http://schemas.microsoft.com/office/drawing/2014/main" id="{9C8D9F47-FD33-4F01-B87B-521FBF0F3900}"/>
+              </a:ext>
+            </a:extLst>
+          </p:cNvPr>
+          <p:cNvPicPr>
+            <a:picLocks noChangeAspect="1"/>
+          </p:cNvPicPr>
+          <p:nvPr/>
+        </p:nvPicPr>
+        <p:blipFill>
+          <a:blip r:embed="rId4">
+            <a:extLst>
+              <a:ext uri="{96DAC541-7B7A-43D3-8B79-37D633B846F1}">
+                <asvg:svgBlip xmlns:asvg="http://schemas.microsoft.com/office/drawing/2016/SVG/main" r:embed="rId5"/>
+              </a:ext>
+            </a:extLst>
+          </a:blip>
+          <a:stretch>
+            <a:fillRect/>
+          </a:stretch>
+        </p:blipFill>
+        <p:spPr>
+          <a:xfrm>
+            <a:off x="737091" y="1653562"/>
+            <a:ext cx="4238305" cy="3271457"/>
+          </a:xfrm>
+          <a:prstGeom prst="rect">
+            <a:avLst/>
+          </a:prstGeom>
+          <a:effectLst>
+            <a:outerShdw blurRad="228600" dist="38100" dir="2700000" algn="tl" rotWithShape="0">
+              <a:prstClr val="black">
+                <a:alpha val="40000"/>
+              </a:prstClr>
+            </a:outerShdw>
+          </a:effectLst>
+        </p:spPr>
+      </p:pic>
+      <p:grpSp>
+        <p:nvGrpSpPr>
+          <p:cNvPr id="37" name="Group 36">
+            <a:extLst>
+              <a:ext uri="{FF2B5EF4-FFF2-40B4-BE49-F238E27FC236}">
+                <a16:creationId xmlns:a16="http://schemas.microsoft.com/office/drawing/2014/main" id="{912968AE-1A7A-43C1-B782-41E2C71A9B4F}"/>
+              </a:ext>
+            </a:extLst>
+          </p:cNvPr>
+          <p:cNvGrpSpPr/>
+          <p:nvPr/>
+        </p:nvGrpSpPr>
+        <p:grpSpPr>
+          <a:xfrm>
+            <a:off x="336958" y="183393"/>
+            <a:ext cx="2164943" cy="586522"/>
+            <a:chOff x="336958" y="183393"/>
+            <a:chExt cx="2164943" cy="586522"/>
+          </a:xfrm>
+        </p:grpSpPr>
+        <p:sp>
+          <p:nvSpPr>
+            <p:cNvPr id="17" name="Title 3">
+              <a:extLst>
+                <a:ext uri="{FF2B5EF4-FFF2-40B4-BE49-F238E27FC236}">
+                  <a16:creationId xmlns:a16="http://schemas.microsoft.com/office/drawing/2014/main" id="{C81C530D-D835-4A1A-81BE-BE9F0DE02236}"/>
+                </a:ext>
+              </a:extLst>
+            </p:cNvPr>
+            <p:cNvSpPr txBox="1">
+              <a:spLocks/>
+            </p:cNvSpPr>
+            <p:nvPr/>
+          </p:nvSpPr>
+          <p:spPr>
+            <a:xfrm>
+              <a:off x="716267" y="183393"/>
+              <a:ext cx="1785634" cy="586522"/>
+            </a:xfrm>
+            <a:prstGeom prst="rect">
+              <a:avLst/>
+            </a:prstGeom>
+            <a:effectLst/>
+          </p:spPr>
+          <p:txBody>
+            <a:bodyPr lIns="0" tIns="0" rIns="0" bIns="0" anchor="ctr">
+              <a:noAutofit/>
+            </a:bodyPr>
+            <a:lstStyle>
+              <a:lvl1pPr algn="l" defTabSz="914355" rtl="0" eaLnBrk="1" latinLnBrk="0" hangingPunct="1">
+                <a:lnSpc>
+                  <a:spcPct val="90000"/>
+                </a:lnSpc>
+                <a:spcBef>
+                  <a:spcPct val="0"/>
+                </a:spcBef>
+                <a:buNone/>
+                <a:defRPr sz="2800" b="0" i="0" kern="1200" spc="0" baseline="0">
+                  <a:solidFill>
+                    <a:schemeClr val="accent2"/>
+                  </a:solidFill>
+                  <a:latin typeface="+mj-lt"/>
+                  <a:ea typeface="+mj-ea"/>
+                  <a:cs typeface="Century Gothic Regular" charset="0"/>
+                </a:defRPr>
+              </a:lvl1pPr>
+            </a:lstStyle>
+            <a:p>
+              <a:pPr>
+                <a:lnSpc>
+                  <a:spcPct val="100000"/>
+                </a:lnSpc>
+              </a:pPr>
+              <a:r>
+                <a:rPr lang="en-GB" sz="2000" spc="-143" dirty="0">
+                  <a:solidFill>
+                    <a:srgbClr val="001A3E"/>
+                  </a:solidFill>
+                  <a:latin typeface="Inter SemiBold" panose="020B0502030000000004" pitchFamily="34" charset="0"/>
+                  <a:ea typeface="Inter SemiBold" panose="020B0502030000000004" pitchFamily="34" charset="0"/>
+                  <a:cs typeface="Mark OT Light" charset="0"/>
+                </a:rPr>
+                <a:t>rakirahman.me</a:t>
+              </a:r>
+            </a:p>
+          </p:txBody>
+        </p:sp>
+        <p:grpSp>
+          <p:nvGrpSpPr>
+            <p:cNvPr id="36" name="Group 35">
+              <a:extLst>
+                <a:ext uri="{FF2B5EF4-FFF2-40B4-BE49-F238E27FC236}">
+                  <a16:creationId xmlns:a16="http://schemas.microsoft.com/office/drawing/2014/main" id="{7BF3B3F5-DAF0-4F2A-B1C5-21D1ABFA0C0F}"/>
+                </a:ext>
+              </a:extLst>
+            </p:cNvPr>
+            <p:cNvGrpSpPr/>
+            <p:nvPr/>
+          </p:nvGrpSpPr>
+          <p:grpSpPr>
+            <a:xfrm>
+              <a:off x="336958" y="313998"/>
+              <a:ext cx="310070" cy="310070"/>
+              <a:chOff x="336958" y="313998"/>
+              <a:chExt cx="310070" cy="310070"/>
+            </a:xfrm>
+          </p:grpSpPr>
+          <p:sp>
+            <p:nvSpPr>
+              <p:cNvPr id="10" name="Oval 9">
+                <a:extLst>
+                  <a:ext uri="{FF2B5EF4-FFF2-40B4-BE49-F238E27FC236}">
+                    <a16:creationId xmlns:a16="http://schemas.microsoft.com/office/drawing/2014/main" id="{9DF77205-F447-474E-B06F-477A11C4D33E}"/>
+                  </a:ext>
+                </a:extLst>
+              </p:cNvPr>
+              <p:cNvSpPr/>
+              <p:nvPr/>
+            </p:nvSpPr>
+            <p:spPr>
+              <a:xfrm>
+                <a:off x="336958" y="313998"/>
+                <a:ext cx="310070" cy="310070"/>
+              </a:xfrm>
+              <a:prstGeom prst="ellipse">
+                <a:avLst/>
+              </a:prstGeom>
+              <a:solidFill>
+                <a:srgbClr val="001A3E"/>
+              </a:solidFill>
+              <a:ln>
+                <a:noFill/>
+              </a:ln>
+              <a:effectLst/>
+            </p:spPr>
+            <p:style>
+              <a:lnRef idx="2">
+                <a:schemeClr val="accent1">
+                  <a:shade val="50000"/>
+                </a:schemeClr>
+              </a:lnRef>
+              <a:fillRef idx="1">
+                <a:schemeClr val="accent1"/>
+              </a:fillRef>
+              <a:effectRef idx="0">
+                <a:schemeClr val="accent1"/>
+              </a:effectRef>
+              <a:fontRef idx="minor">
+                <a:schemeClr val="lt1"/>
+              </a:fontRef>
+            </p:style>
+            <p:txBody>
+              <a:bodyPr rtlCol="0" anchor="ctr"/>
+              <a:lstStyle/>
+              <a:p>
+                <a:pPr algn="ctr"/>
+                <a:endParaRPr lang="en-US" dirty="0"/>
+              </a:p>
+            </p:txBody>
+          </p:sp>
+          <p:pic>
+            <p:nvPicPr>
+              <p:cNvPr id="35" name="Picture 34">
+                <a:extLst>
+                  <a:ext uri="{FF2B5EF4-FFF2-40B4-BE49-F238E27FC236}">
+                    <a16:creationId xmlns:a16="http://schemas.microsoft.com/office/drawing/2014/main" id="{35CFC7CD-38EF-4FB8-A968-97D0473BA258}"/>
+                  </a:ext>
+                </a:extLst>
+              </p:cNvPr>
+              <p:cNvPicPr>
+                <a:picLocks noChangeAspect="1"/>
+              </p:cNvPicPr>
+              <p:nvPr/>
+            </p:nvPicPr>
+            <p:blipFill>
+              <a:blip r:embed="rId6">
+                <a:extLst>
+                  <a:ext uri="{28A0092B-C50C-407E-A947-70E740481C1C}">
+                    <a14:useLocalDpi xmlns:a14="http://schemas.microsoft.com/office/drawing/2010/main" val="0"/>
+                  </a:ext>
+                </a:extLst>
+              </a:blip>
+              <a:stretch>
+                <a:fillRect/>
+              </a:stretch>
+            </p:blipFill>
+            <p:spPr>
+              <a:xfrm>
+                <a:off x="362920" y="339960"/>
+                <a:ext cx="258147" cy="258147"/>
+              </a:xfrm>
+              <a:prstGeom prst="ellipse">
+                <a:avLst/>
+              </a:prstGeom>
+            </p:spPr>
+          </p:pic>
+        </p:grpSp>
+      </p:grpSp>
+      <p:grpSp>
+        <p:nvGrpSpPr>
+          <p:cNvPr id="31" name="Group 30">
+            <a:extLst>
+              <a:ext uri="{FF2B5EF4-FFF2-40B4-BE49-F238E27FC236}">
+                <a16:creationId xmlns:a16="http://schemas.microsoft.com/office/drawing/2014/main" id="{F7A52655-41BB-4EA3-AD92-FFB63DED5237}"/>
+              </a:ext>
+            </a:extLst>
+          </p:cNvPr>
+          <p:cNvGrpSpPr/>
+          <p:nvPr/>
+        </p:nvGrpSpPr>
+        <p:grpSpPr>
+          <a:xfrm>
+            <a:off x="7962900" y="1238249"/>
+            <a:ext cx="3919000" cy="4102083"/>
+            <a:chOff x="7962900" y="1238249"/>
+            <a:chExt cx="3919000" cy="4102083"/>
+          </a:xfrm>
+        </p:grpSpPr>
+        <p:sp>
+          <p:nvSpPr>
+            <p:cNvPr id="13" name="Oval 12">
+              <a:extLst>
+                <a:ext uri="{FF2B5EF4-FFF2-40B4-BE49-F238E27FC236}">
+                  <a16:creationId xmlns:a16="http://schemas.microsoft.com/office/drawing/2014/main" id="{E6C7DC24-8059-42CD-A673-0415702D9A9C}"/>
+                </a:ext>
+              </a:extLst>
+            </p:cNvPr>
+            <p:cNvSpPr/>
+            <p:nvPr/>
+          </p:nvSpPr>
+          <p:spPr>
+            <a:xfrm>
+              <a:off x="7962900" y="1238249"/>
+              <a:ext cx="3919000" cy="3919000"/>
+            </a:xfrm>
+            <a:prstGeom prst="ellipse">
+              <a:avLst/>
+            </a:prstGeom>
+            <a:solidFill>
+              <a:srgbClr val="FFF67F"/>
+            </a:solidFill>
+            <a:ln>
+              <a:noFill/>
+            </a:ln>
+          </p:spPr>
+          <p:style>
+            <a:lnRef idx="2">
+              <a:schemeClr val="accent1">
+                <a:shade val="50000"/>
+              </a:schemeClr>
+            </a:lnRef>
+            <a:fillRef idx="1">
+              <a:schemeClr val="accent1"/>
+            </a:fillRef>
+            <a:effectRef idx="0">
+              <a:schemeClr val="accent1"/>
+            </a:effectRef>
+            <a:fontRef idx="minor">
+              <a:schemeClr val="lt1"/>
+            </a:fontRef>
+          </p:style>
+          <p:txBody>
+            <a:bodyPr rtlCol="0" anchor="ctr"/>
+            <a:lstStyle/>
+            <a:p>
+              <a:pPr algn="ctr"/>
+              <a:endParaRPr lang="en-US"/>
+            </a:p>
+          </p:txBody>
+        </p:sp>
+        <p:grpSp>
+          <p:nvGrpSpPr>
+            <p:cNvPr id="19" name="Group 18">
+              <a:extLst>
+                <a:ext uri="{FF2B5EF4-FFF2-40B4-BE49-F238E27FC236}">
+                  <a16:creationId xmlns:a16="http://schemas.microsoft.com/office/drawing/2014/main" id="{022244C5-3729-4FB9-987F-F7E23DD4575D}"/>
+                </a:ext>
+              </a:extLst>
+            </p:cNvPr>
+            <p:cNvGrpSpPr/>
+            <p:nvPr/>
+          </p:nvGrpSpPr>
+          <p:grpSpPr>
+            <a:xfrm>
+              <a:off x="8252807" y="1631401"/>
+              <a:ext cx="3339185" cy="3708931"/>
+              <a:chOff x="8252808" y="1582225"/>
+              <a:chExt cx="3339185" cy="3708931"/>
+            </a:xfrm>
+          </p:grpSpPr>
+          <p:pic>
+            <p:nvPicPr>
+              <p:cNvPr id="3" name="Picture 2">
+                <a:extLst>
+                  <a:ext uri="{FF2B5EF4-FFF2-40B4-BE49-F238E27FC236}">
+                    <a16:creationId xmlns:a16="http://schemas.microsoft.com/office/drawing/2014/main" id="{53A78B2B-54C4-45AB-9C8B-9DF1FEC4A250}"/>
+                  </a:ext>
+                </a:extLst>
+              </p:cNvPr>
+              <p:cNvPicPr>
+                <a:picLocks noChangeAspect="1"/>
+              </p:cNvPicPr>
+              <p:nvPr/>
+            </p:nvPicPr>
+            <p:blipFill>
+              <a:blip r:embed="rId7">
+                <a:extLst>
+                  <a:ext uri="{28A0092B-C50C-407E-A947-70E740481C1C}">
+                    <a14:useLocalDpi xmlns:a14="http://schemas.microsoft.com/office/drawing/2010/main" val="0"/>
+                  </a:ext>
+                </a:extLst>
+              </a:blip>
+              <a:stretch>
+                <a:fillRect/>
+              </a:stretch>
+            </p:blipFill>
+            <p:spPr>
+              <a:xfrm>
+                <a:off x="8252808" y="1582225"/>
+                <a:ext cx="3339185" cy="3708931"/>
+              </a:xfrm>
+              <a:prstGeom prst="rect">
+                <a:avLst/>
+              </a:prstGeom>
+              <a:effectLst>
+                <a:outerShdw blurRad="50800" dist="38100" dir="2700000" algn="tl" rotWithShape="0">
+                  <a:prstClr val="black">
+                    <a:alpha val="40000"/>
+                  </a:prstClr>
+                </a:outerShdw>
+              </a:effectLst>
+            </p:spPr>
+          </p:pic>
+          <p:sp>
+            <p:nvSpPr>
+              <p:cNvPr id="18" name="Rectangle 17">
+                <a:extLst>
+                  <a:ext uri="{FF2B5EF4-FFF2-40B4-BE49-F238E27FC236}">
+                    <a16:creationId xmlns:a16="http://schemas.microsoft.com/office/drawing/2014/main" id="{52244397-FDB0-40F6-8FED-09A88D6909B3}"/>
+                  </a:ext>
+                </a:extLst>
+              </p:cNvPr>
+              <p:cNvSpPr/>
+              <p:nvPr/>
+            </p:nvSpPr>
+            <p:spPr>
+              <a:xfrm>
+                <a:off x="8874650" y="3460939"/>
+                <a:ext cx="2095500" cy="262423"/>
+              </a:xfrm>
+              <a:prstGeom prst="rect">
+                <a:avLst/>
+              </a:prstGeom>
+              <a:solidFill>
+                <a:srgbClr val="FFFFFF"/>
+              </a:solidFill>
+              <a:ln>
+                <a:noFill/>
+              </a:ln>
+            </p:spPr>
+            <p:style>
+              <a:lnRef idx="2">
+                <a:schemeClr val="accent1">
+                  <a:shade val="50000"/>
+                </a:schemeClr>
+              </a:lnRef>
+              <a:fillRef idx="1">
+                <a:schemeClr val="accent1"/>
+              </a:fillRef>
+              <a:effectRef idx="0">
+                <a:schemeClr val="accent1"/>
+              </a:effectRef>
+              <a:fontRef idx="minor">
+                <a:schemeClr val="lt1"/>
+              </a:fontRef>
+            </p:style>
+            <p:txBody>
+              <a:bodyPr rtlCol="0" anchor="ctr"/>
+              <a:lstStyle/>
+              <a:p>
+                <a:pPr algn="ctr"/>
+                <a:endParaRPr lang="en-US">
+                  <a:solidFill>
+                    <a:srgbClr val="FFFFFF"/>
+                  </a:solidFill>
+                </a:endParaRPr>
+              </a:p>
+            </p:txBody>
+          </p:sp>
+          <p:pic>
+            <p:nvPicPr>
+              <p:cNvPr id="7" name="Picture 6">
+                <a:extLst>
+                  <a:ext uri="{FF2B5EF4-FFF2-40B4-BE49-F238E27FC236}">
+                    <a16:creationId xmlns:a16="http://schemas.microsoft.com/office/drawing/2014/main" id="{AAC3DB36-52F1-4CEF-AACE-6A4777A6AA93}"/>
+                  </a:ext>
+                </a:extLst>
+              </p:cNvPr>
+              <p:cNvPicPr>
+                <a:picLocks noChangeAspect="1"/>
+              </p:cNvPicPr>
+              <p:nvPr/>
+            </p:nvPicPr>
+            <p:blipFill>
+              <a:blip r:embed="rId8">
+                <a:extLst>
+                  <a:ext uri="{28A0092B-C50C-407E-A947-70E740481C1C}">
+                    <a14:useLocalDpi xmlns:a14="http://schemas.microsoft.com/office/drawing/2010/main" val="0"/>
+                  </a:ext>
+                </a:extLst>
+              </a:blip>
+              <a:stretch>
+                <a:fillRect/>
+              </a:stretch>
+            </p:blipFill>
+            <p:spPr>
+              <a:xfrm>
+                <a:off x="9275877" y="3460939"/>
+                <a:ext cx="1293046" cy="658981"/>
+              </a:xfrm>
+              <a:prstGeom prst="rect">
+                <a:avLst/>
+              </a:prstGeom>
+            </p:spPr>
+          </p:pic>
+        </p:grpSp>
+      </p:grpSp>
+      <p:sp>
+        <p:nvSpPr>
+          <p:cNvPr id="22" name="TextBox 21">
+            <a:extLst>
+              <a:ext uri="{FF2B5EF4-FFF2-40B4-BE49-F238E27FC236}">
+                <a16:creationId xmlns:a16="http://schemas.microsoft.com/office/drawing/2014/main" id="{35F038A1-1D7B-4A52-BF04-3AD4EA6BF06F}"/>
+              </a:ext>
+            </a:extLst>
+          </p:cNvPr>
+          <p:cNvSpPr txBox="1"/>
+          <p:nvPr/>
+        </p:nvSpPr>
+        <p:spPr>
+          <a:xfrm rot="20991049">
+            <a:off x="-449553" y="2399234"/>
+            <a:ext cx="6408991" cy="2221762"/>
+          </a:xfrm>
+          <a:prstGeom prst="rect">
+            <a:avLst/>
+          </a:prstGeom>
+          <a:noFill/>
+          <a:effectLst/>
+        </p:spPr>
+        <p:txBody>
+          <a:bodyPr wrap="square" anchor="ctr">
+            <a:spAutoFit/>
+          </a:bodyPr>
+          <a:lstStyle/>
+          <a:p>
+            <a:pPr algn="ctr">
+              <a:lnSpc>
+                <a:spcPts val="5000"/>
+              </a:lnSpc>
+            </a:pPr>
+            <a:r>
+              <a:rPr lang="en-GB" sz="2000" spc="100" dirty="0">
+                <a:solidFill>
+                  <a:srgbClr val="001A3E"/>
+                </a:solidFill>
+                <a:latin typeface="Nutmeg Regular" panose="00000500000000000000" pitchFamily="2" charset="0"/>
+                <a:ea typeface="Inter" panose="020B0502030000000004" pitchFamily="34" charset="0"/>
+                <a:cs typeface="Mark OT Light" charset="0"/>
+              </a:rPr>
+              <a:t>COMPREHENSIVE</a:t>
+            </a:r>
+            <a:endParaRPr lang="en-GB" sz="2800" spc="100" dirty="0">
+              <a:solidFill>
+                <a:srgbClr val="001A3E"/>
+              </a:solidFill>
+              <a:latin typeface="Nutmeg Regular" panose="00000500000000000000" pitchFamily="2" charset="0"/>
+              <a:ea typeface="Inter" panose="020B0502030000000004" pitchFamily="34" charset="0"/>
+              <a:cs typeface="Mark OT Light" charset="0"/>
+            </a:endParaRPr>
+          </a:p>
+          <a:p>
+            <a:pPr algn="ctr">
+              <a:lnSpc>
+                <a:spcPts val="5500"/>
+              </a:lnSpc>
+            </a:pPr>
+            <a:r>
+              <a:rPr lang="en-GB" sz="6600" spc="-210" dirty="0">
+                <a:solidFill>
+                  <a:srgbClr val="001A3E"/>
+                </a:solidFill>
+                <a:latin typeface="Nutmeg Black Italic" panose="00000900000000000000" pitchFamily="2" charset="0"/>
+                <a:ea typeface="Inter" panose="020B0502030000000004" pitchFamily="34" charset="0"/>
+                <a:cs typeface="Mark OT Light" charset="0"/>
+              </a:rPr>
+              <a:t>STUDY </a:t>
+            </a:r>
+            <a:br>
+              <a:rPr lang="en-GB" sz="6600" spc="-210" dirty="0">
+                <a:solidFill>
+                  <a:srgbClr val="001A3E"/>
+                </a:solidFill>
+                <a:latin typeface="Nutmeg Black Italic" panose="00000900000000000000" pitchFamily="2" charset="0"/>
+                <a:ea typeface="Inter" panose="020B0502030000000004" pitchFamily="34" charset="0"/>
+                <a:cs typeface="Mark OT Light" charset="0"/>
+              </a:rPr>
+            </a:br>
+            <a:r>
+              <a:rPr lang="en-GB" sz="6600" spc="-210" dirty="0">
+                <a:solidFill>
+                  <a:srgbClr val="001A3E"/>
+                </a:solidFill>
+                <a:latin typeface="Nutmeg Black Italic" panose="00000900000000000000" pitchFamily="2" charset="0"/>
+                <a:ea typeface="Inter" panose="020B0502030000000004" pitchFamily="34" charset="0"/>
+                <a:cs typeface="Mark OT Light" charset="0"/>
+              </a:rPr>
+              <a:t>GUIDE</a:t>
+            </a:r>
+          </a:p>
+        </p:txBody>
+      </p:sp>
+      <p:sp>
+        <p:nvSpPr>
+          <p:cNvPr id="14" name="TextBox 13">
+            <a:extLst>
+              <a:ext uri="{FF2B5EF4-FFF2-40B4-BE49-F238E27FC236}">
+                <a16:creationId xmlns:a16="http://schemas.microsoft.com/office/drawing/2014/main" id="{B4235A3A-5AD8-426B-B9A9-E6740CD8DB1A}"/>
+              </a:ext>
+            </a:extLst>
+          </p:cNvPr>
+          <p:cNvSpPr txBox="1"/>
+          <p:nvPr/>
+        </p:nvSpPr>
+        <p:spPr>
+          <a:xfrm rot="20991049">
+            <a:off x="1226612" y="1849261"/>
+            <a:ext cx="4879997" cy="623248"/>
+          </a:xfrm>
+          <a:prstGeom prst="rect">
+            <a:avLst/>
+          </a:prstGeom>
+          <a:noFill/>
+          <a:effectLst/>
+        </p:spPr>
+        <p:txBody>
+          <a:bodyPr wrap="square" anchor="ctr">
+            <a:spAutoFit/>
+          </a:bodyPr>
+          <a:lstStyle/>
+          <a:p>
+            <a:pPr algn="ctr">
+              <a:lnSpc>
+                <a:spcPts val="4400"/>
+              </a:lnSpc>
+            </a:pPr>
+            <a:r>
+              <a:rPr lang="en-GB" sz="2800" spc="100" dirty="0">
+                <a:solidFill>
+                  <a:srgbClr val="EFB504"/>
+                </a:solidFill>
+                <a:latin typeface="Bebas Neue" panose="020B0606020202050201" pitchFamily="34" charset="0"/>
+                <a:ea typeface="Inter" panose="020B0502030000000004" pitchFamily="34" charset="0"/>
+                <a:cs typeface="Mark OT Light" charset="0"/>
+              </a:rPr>
+              <a:t>PART 1</a:t>
+            </a:r>
+            <a:endParaRPr lang="en-GB" sz="4800" spc="-210" dirty="0">
+              <a:solidFill>
+                <a:srgbClr val="EFB504"/>
+              </a:solidFill>
+              <a:latin typeface="Bebas Neue" panose="020B0606020202050201" pitchFamily="34" charset="0"/>
+              <a:ea typeface="Inter" panose="020B0502030000000004" pitchFamily="34" charset="0"/>
+              <a:cs typeface="Mark OT Light" charset="0"/>
+            </a:endParaRPr>
+          </a:p>
+        </p:txBody>
+      </p:sp>
+    </p:spTree>
+    <p:extLst>
+      <p:ext uri="{BB962C8B-B14F-4D97-AF65-F5344CB8AC3E}">
+        <p14:creationId xmlns:p14="http://schemas.microsoft.com/office/powerpoint/2010/main" val="330472966"/>
+      </p:ext>
+    </p:extLst>
+  </p:cSld>
+  <p:clrMapOvr>
+    <a:masterClrMapping/>
+  </p:clrMapOvr>
+</p:sld>
+</file>
+
+<file path=ppt/slides/slide6.xml><?xml version="1.0" encoding="utf-8"?>
+<p:sld xmlns:a="http://schemas.openxmlformats.org/drawingml/2006/main" xmlns:r="http://schemas.openxmlformats.org/officeDocument/2006/relationships" xmlns:p="http://schemas.openxmlformats.org/presentationml/2006/main">
+  <p:cSld>
+    <p:spTree>
+      <p:nvGrpSpPr>
+        <p:cNvPr id="1" name=""/>
+        <p:cNvGrpSpPr/>
+        <p:nvPr/>
+      </p:nvGrpSpPr>
+      <p:grpSpPr>
+        <a:xfrm>
+          <a:off x="0" y="0"/>
+          <a:ext cx="0" cy="0"/>
+          <a:chOff x="0" y="0"/>
+          <a:chExt cx="0" cy="0"/>
+        </a:xfrm>
+      </p:grpSpPr>
+      <p:pic>
+        <p:nvPicPr>
+          <p:cNvPr id="16" name="Graphic 15">
+            <a:extLst>
+              <a:ext uri="{FF2B5EF4-FFF2-40B4-BE49-F238E27FC236}">
+                <a16:creationId xmlns:a16="http://schemas.microsoft.com/office/drawing/2014/main" id="{3314DD05-E841-4158-8982-E436D37DCE6D}"/>
+              </a:ext>
+            </a:extLst>
+          </p:cNvPr>
+          <p:cNvPicPr>
+            <a:picLocks noChangeAspect="1"/>
+          </p:cNvPicPr>
+          <p:nvPr/>
+        </p:nvPicPr>
+        <p:blipFill>
+          <a:blip r:embed="rId2">
+            <a:extLst>
+              <a:ext uri="{96DAC541-7B7A-43D3-8B79-37D633B846F1}">
+                <asvg:svgBlip xmlns:asvg="http://schemas.microsoft.com/office/drawing/2016/SVG/main" r:embed="rId3"/>
+              </a:ext>
+            </a:extLst>
+          </a:blip>
+          <a:stretch>
+            <a:fillRect/>
+          </a:stretch>
+        </p:blipFill>
+        <p:spPr>
+          <a:xfrm>
+            <a:off x="-1" y="0"/>
+            <a:ext cx="12252325" cy="5999162"/>
+          </a:xfrm>
+          <a:prstGeom prst="rect">
+            <a:avLst/>
+          </a:prstGeom>
+        </p:spPr>
+      </p:pic>
+      <p:pic>
+        <p:nvPicPr>
+          <p:cNvPr id="30" name="Graphic 29">
+            <a:extLst>
+              <a:ext uri="{FF2B5EF4-FFF2-40B4-BE49-F238E27FC236}">
+                <a16:creationId xmlns:a16="http://schemas.microsoft.com/office/drawing/2014/main" id="{9C8D9F47-FD33-4F01-B87B-521FBF0F3900}"/>
+              </a:ext>
+            </a:extLst>
+          </p:cNvPr>
+          <p:cNvPicPr>
+            <a:picLocks noChangeAspect="1"/>
+          </p:cNvPicPr>
+          <p:nvPr/>
+        </p:nvPicPr>
+        <p:blipFill>
+          <a:blip r:embed="rId4">
+            <a:extLst>
+              <a:ext uri="{96DAC541-7B7A-43D3-8B79-37D633B846F1}">
+                <asvg:svgBlip xmlns:asvg="http://schemas.microsoft.com/office/drawing/2016/SVG/main" r:embed="rId5"/>
+              </a:ext>
+            </a:extLst>
+          </a:blip>
+          <a:stretch>
+            <a:fillRect/>
+          </a:stretch>
+        </p:blipFill>
+        <p:spPr>
+          <a:xfrm>
+            <a:off x="737091" y="1653562"/>
+            <a:ext cx="4238305" cy="3271457"/>
+          </a:xfrm>
+          <a:prstGeom prst="rect">
+            <a:avLst/>
+          </a:prstGeom>
+          <a:effectLst>
+            <a:outerShdw blurRad="228600" dist="38100" dir="2700000" algn="tl" rotWithShape="0">
+              <a:prstClr val="black">
+                <a:alpha val="40000"/>
+              </a:prstClr>
+            </a:outerShdw>
+          </a:effectLst>
+        </p:spPr>
+      </p:pic>
+      <p:grpSp>
+        <p:nvGrpSpPr>
+          <p:cNvPr id="37" name="Group 36">
+            <a:extLst>
+              <a:ext uri="{FF2B5EF4-FFF2-40B4-BE49-F238E27FC236}">
+                <a16:creationId xmlns:a16="http://schemas.microsoft.com/office/drawing/2014/main" id="{912968AE-1A7A-43C1-B782-41E2C71A9B4F}"/>
+              </a:ext>
+            </a:extLst>
+          </p:cNvPr>
+          <p:cNvGrpSpPr/>
+          <p:nvPr/>
+        </p:nvGrpSpPr>
+        <p:grpSpPr>
+          <a:xfrm>
+            <a:off x="336958" y="183393"/>
+            <a:ext cx="2164943" cy="586522"/>
+            <a:chOff x="336958" y="183393"/>
+            <a:chExt cx="2164943" cy="586522"/>
+          </a:xfrm>
+        </p:grpSpPr>
+        <p:sp>
+          <p:nvSpPr>
+            <p:cNvPr id="17" name="Title 3">
+              <a:extLst>
+                <a:ext uri="{FF2B5EF4-FFF2-40B4-BE49-F238E27FC236}">
+                  <a16:creationId xmlns:a16="http://schemas.microsoft.com/office/drawing/2014/main" id="{C81C530D-D835-4A1A-81BE-BE9F0DE02236}"/>
+                </a:ext>
+              </a:extLst>
+            </p:cNvPr>
+            <p:cNvSpPr txBox="1">
+              <a:spLocks/>
+            </p:cNvSpPr>
+            <p:nvPr/>
+          </p:nvSpPr>
+          <p:spPr>
+            <a:xfrm>
+              <a:off x="716267" y="183393"/>
+              <a:ext cx="1785634" cy="586522"/>
+            </a:xfrm>
+            <a:prstGeom prst="rect">
+              <a:avLst/>
+            </a:prstGeom>
+            <a:effectLst/>
+          </p:spPr>
+          <p:txBody>
+            <a:bodyPr lIns="0" tIns="0" rIns="0" bIns="0" anchor="ctr">
+              <a:noAutofit/>
+            </a:bodyPr>
+            <a:lstStyle>
+              <a:lvl1pPr algn="l" defTabSz="914355" rtl="0" eaLnBrk="1" latinLnBrk="0" hangingPunct="1">
+                <a:lnSpc>
+                  <a:spcPct val="90000"/>
+                </a:lnSpc>
+                <a:spcBef>
+                  <a:spcPct val="0"/>
+                </a:spcBef>
+                <a:buNone/>
+                <a:defRPr sz="2800" b="0" i="0" kern="1200" spc="0" baseline="0">
+                  <a:solidFill>
+                    <a:schemeClr val="accent2"/>
+                  </a:solidFill>
+                  <a:latin typeface="+mj-lt"/>
+                  <a:ea typeface="+mj-ea"/>
+                  <a:cs typeface="Century Gothic Regular" charset="0"/>
+                </a:defRPr>
+              </a:lvl1pPr>
+            </a:lstStyle>
+            <a:p>
+              <a:pPr>
+                <a:lnSpc>
+                  <a:spcPct val="100000"/>
+                </a:lnSpc>
+              </a:pPr>
+              <a:r>
+                <a:rPr lang="en-GB" sz="2000" spc="-143" dirty="0">
+                  <a:solidFill>
+                    <a:srgbClr val="001A3E"/>
+                  </a:solidFill>
+                  <a:latin typeface="Inter SemiBold" panose="020B0502030000000004" pitchFamily="34" charset="0"/>
+                  <a:ea typeface="Inter SemiBold" panose="020B0502030000000004" pitchFamily="34" charset="0"/>
+                  <a:cs typeface="Mark OT Light" charset="0"/>
+                </a:rPr>
+                <a:t>rakirahman.me</a:t>
+              </a:r>
+            </a:p>
+          </p:txBody>
+        </p:sp>
+        <p:grpSp>
+          <p:nvGrpSpPr>
+            <p:cNvPr id="36" name="Group 35">
+              <a:extLst>
+                <a:ext uri="{FF2B5EF4-FFF2-40B4-BE49-F238E27FC236}">
+                  <a16:creationId xmlns:a16="http://schemas.microsoft.com/office/drawing/2014/main" id="{7BF3B3F5-DAF0-4F2A-B1C5-21D1ABFA0C0F}"/>
+                </a:ext>
+              </a:extLst>
+            </p:cNvPr>
+            <p:cNvGrpSpPr/>
+            <p:nvPr/>
+          </p:nvGrpSpPr>
+          <p:grpSpPr>
+            <a:xfrm>
+              <a:off x="336958" y="313998"/>
+              <a:ext cx="310070" cy="310070"/>
+              <a:chOff x="336958" y="313998"/>
+              <a:chExt cx="310070" cy="310070"/>
+            </a:xfrm>
+          </p:grpSpPr>
+          <p:sp>
+            <p:nvSpPr>
+              <p:cNvPr id="10" name="Oval 9">
+                <a:extLst>
+                  <a:ext uri="{FF2B5EF4-FFF2-40B4-BE49-F238E27FC236}">
+                    <a16:creationId xmlns:a16="http://schemas.microsoft.com/office/drawing/2014/main" id="{9DF77205-F447-474E-B06F-477A11C4D33E}"/>
+                  </a:ext>
+                </a:extLst>
+              </p:cNvPr>
+              <p:cNvSpPr/>
+              <p:nvPr/>
+            </p:nvSpPr>
+            <p:spPr>
+              <a:xfrm>
+                <a:off x="336958" y="313998"/>
+                <a:ext cx="310070" cy="310070"/>
+              </a:xfrm>
+              <a:prstGeom prst="ellipse">
+                <a:avLst/>
+              </a:prstGeom>
+              <a:solidFill>
+                <a:srgbClr val="001A3E"/>
+              </a:solidFill>
+              <a:ln>
+                <a:noFill/>
+              </a:ln>
+              <a:effectLst/>
+            </p:spPr>
+            <p:style>
+              <a:lnRef idx="2">
+                <a:schemeClr val="accent1">
+                  <a:shade val="50000"/>
+                </a:schemeClr>
+              </a:lnRef>
+              <a:fillRef idx="1">
+                <a:schemeClr val="accent1"/>
+              </a:fillRef>
+              <a:effectRef idx="0">
+                <a:schemeClr val="accent1"/>
+              </a:effectRef>
+              <a:fontRef idx="minor">
+                <a:schemeClr val="lt1"/>
+              </a:fontRef>
+            </p:style>
+            <p:txBody>
+              <a:bodyPr rtlCol="0" anchor="ctr"/>
+              <a:lstStyle/>
+              <a:p>
+                <a:pPr algn="ctr"/>
+                <a:endParaRPr lang="en-US" dirty="0"/>
+              </a:p>
+            </p:txBody>
+          </p:sp>
+          <p:pic>
+            <p:nvPicPr>
+              <p:cNvPr id="35" name="Picture 34">
+                <a:extLst>
+                  <a:ext uri="{FF2B5EF4-FFF2-40B4-BE49-F238E27FC236}">
+                    <a16:creationId xmlns:a16="http://schemas.microsoft.com/office/drawing/2014/main" id="{35CFC7CD-38EF-4FB8-A968-97D0473BA258}"/>
+                  </a:ext>
+                </a:extLst>
+              </p:cNvPr>
+              <p:cNvPicPr>
+                <a:picLocks noChangeAspect="1"/>
+              </p:cNvPicPr>
+              <p:nvPr/>
+            </p:nvPicPr>
+            <p:blipFill>
+              <a:blip r:embed="rId6">
+                <a:extLst>
+                  <a:ext uri="{28A0092B-C50C-407E-A947-70E740481C1C}">
+                    <a14:useLocalDpi xmlns:a14="http://schemas.microsoft.com/office/drawing/2010/main" val="0"/>
+                  </a:ext>
+                </a:extLst>
+              </a:blip>
+              <a:stretch>
+                <a:fillRect/>
+              </a:stretch>
+            </p:blipFill>
+            <p:spPr>
+              <a:xfrm>
+                <a:off x="362920" y="339960"/>
+                <a:ext cx="258147" cy="258147"/>
+              </a:xfrm>
+              <a:prstGeom prst="ellipse">
+                <a:avLst/>
+              </a:prstGeom>
+            </p:spPr>
+          </p:pic>
+        </p:grpSp>
+      </p:grpSp>
+      <p:grpSp>
+        <p:nvGrpSpPr>
+          <p:cNvPr id="31" name="Group 30">
+            <a:extLst>
+              <a:ext uri="{FF2B5EF4-FFF2-40B4-BE49-F238E27FC236}">
+                <a16:creationId xmlns:a16="http://schemas.microsoft.com/office/drawing/2014/main" id="{F7A52655-41BB-4EA3-AD92-FFB63DED5237}"/>
+              </a:ext>
+            </a:extLst>
+          </p:cNvPr>
+          <p:cNvGrpSpPr/>
+          <p:nvPr/>
+        </p:nvGrpSpPr>
+        <p:grpSpPr>
+          <a:xfrm>
+            <a:off x="7962900" y="1238249"/>
+            <a:ext cx="3919000" cy="4102083"/>
+            <a:chOff x="7962900" y="1238249"/>
+            <a:chExt cx="3919000" cy="4102083"/>
+          </a:xfrm>
+        </p:grpSpPr>
+        <p:sp>
+          <p:nvSpPr>
+            <p:cNvPr id="13" name="Oval 12">
+              <a:extLst>
+                <a:ext uri="{FF2B5EF4-FFF2-40B4-BE49-F238E27FC236}">
+                  <a16:creationId xmlns:a16="http://schemas.microsoft.com/office/drawing/2014/main" id="{E6C7DC24-8059-42CD-A673-0415702D9A9C}"/>
+                </a:ext>
+              </a:extLst>
+            </p:cNvPr>
+            <p:cNvSpPr/>
+            <p:nvPr/>
+          </p:nvSpPr>
+          <p:spPr>
+            <a:xfrm>
+              <a:off x="7962900" y="1238249"/>
+              <a:ext cx="3919000" cy="3919000"/>
+            </a:xfrm>
+            <a:prstGeom prst="ellipse">
+              <a:avLst/>
+            </a:prstGeom>
+            <a:solidFill>
+              <a:srgbClr val="FFF67F"/>
+            </a:solidFill>
+            <a:ln>
+              <a:noFill/>
+            </a:ln>
+          </p:spPr>
+          <p:style>
+            <a:lnRef idx="2">
+              <a:schemeClr val="accent1">
+                <a:shade val="50000"/>
+              </a:schemeClr>
+            </a:lnRef>
+            <a:fillRef idx="1">
+              <a:schemeClr val="accent1"/>
+            </a:fillRef>
+            <a:effectRef idx="0">
+              <a:schemeClr val="accent1"/>
+            </a:effectRef>
+            <a:fontRef idx="minor">
+              <a:schemeClr val="lt1"/>
+            </a:fontRef>
+          </p:style>
+          <p:txBody>
+            <a:bodyPr rtlCol="0" anchor="ctr"/>
+            <a:lstStyle/>
+            <a:p>
+              <a:pPr algn="ctr"/>
+              <a:endParaRPr lang="en-US"/>
+            </a:p>
+          </p:txBody>
+        </p:sp>
+        <p:grpSp>
+          <p:nvGrpSpPr>
+            <p:cNvPr id="19" name="Group 18">
+              <a:extLst>
+                <a:ext uri="{FF2B5EF4-FFF2-40B4-BE49-F238E27FC236}">
+                  <a16:creationId xmlns:a16="http://schemas.microsoft.com/office/drawing/2014/main" id="{022244C5-3729-4FB9-987F-F7E23DD4575D}"/>
+                </a:ext>
+              </a:extLst>
+            </p:cNvPr>
+            <p:cNvGrpSpPr/>
+            <p:nvPr/>
+          </p:nvGrpSpPr>
+          <p:grpSpPr>
+            <a:xfrm>
+              <a:off x="8252807" y="1631401"/>
+              <a:ext cx="3339185" cy="3708931"/>
+              <a:chOff x="8252808" y="1582225"/>
+              <a:chExt cx="3339185" cy="3708931"/>
+            </a:xfrm>
+          </p:grpSpPr>
+          <p:pic>
+            <p:nvPicPr>
+              <p:cNvPr id="3" name="Picture 2">
+                <a:extLst>
+                  <a:ext uri="{FF2B5EF4-FFF2-40B4-BE49-F238E27FC236}">
+                    <a16:creationId xmlns:a16="http://schemas.microsoft.com/office/drawing/2014/main" id="{53A78B2B-54C4-45AB-9C8B-9DF1FEC4A250}"/>
+                  </a:ext>
+                </a:extLst>
+              </p:cNvPr>
+              <p:cNvPicPr>
+                <a:picLocks noChangeAspect="1"/>
+              </p:cNvPicPr>
+              <p:nvPr/>
+            </p:nvPicPr>
+            <p:blipFill>
+              <a:blip r:embed="rId7">
+                <a:extLst>
+                  <a:ext uri="{28A0092B-C50C-407E-A947-70E740481C1C}">
+                    <a14:useLocalDpi xmlns:a14="http://schemas.microsoft.com/office/drawing/2010/main" val="0"/>
+                  </a:ext>
+                </a:extLst>
+              </a:blip>
+              <a:stretch>
+                <a:fillRect/>
+              </a:stretch>
+            </p:blipFill>
+            <p:spPr>
+              <a:xfrm>
+                <a:off x="8252808" y="1582225"/>
+                <a:ext cx="3339185" cy="3708931"/>
+              </a:xfrm>
+              <a:prstGeom prst="rect">
+                <a:avLst/>
+              </a:prstGeom>
+              <a:effectLst>
+                <a:outerShdw blurRad="50800" dist="38100" dir="2700000" algn="tl" rotWithShape="0">
+                  <a:prstClr val="black">
+                    <a:alpha val="40000"/>
+                  </a:prstClr>
+                </a:outerShdw>
+              </a:effectLst>
+            </p:spPr>
+          </p:pic>
+          <p:sp>
+            <p:nvSpPr>
+              <p:cNvPr id="18" name="Rectangle 17">
+                <a:extLst>
+                  <a:ext uri="{FF2B5EF4-FFF2-40B4-BE49-F238E27FC236}">
+                    <a16:creationId xmlns:a16="http://schemas.microsoft.com/office/drawing/2014/main" id="{52244397-FDB0-40F6-8FED-09A88D6909B3}"/>
+                  </a:ext>
+                </a:extLst>
+              </p:cNvPr>
+              <p:cNvSpPr/>
+              <p:nvPr/>
+            </p:nvSpPr>
+            <p:spPr>
+              <a:xfrm>
+                <a:off x="8874650" y="3460939"/>
+                <a:ext cx="2095500" cy="262423"/>
+              </a:xfrm>
+              <a:prstGeom prst="rect">
+                <a:avLst/>
+              </a:prstGeom>
+              <a:solidFill>
+                <a:srgbClr val="FFFFFF"/>
+              </a:solidFill>
+              <a:ln>
+                <a:noFill/>
+              </a:ln>
+            </p:spPr>
+            <p:style>
+              <a:lnRef idx="2">
+                <a:schemeClr val="accent1">
+                  <a:shade val="50000"/>
+                </a:schemeClr>
+              </a:lnRef>
+              <a:fillRef idx="1">
+                <a:schemeClr val="accent1"/>
+              </a:fillRef>
+              <a:effectRef idx="0">
+                <a:schemeClr val="accent1"/>
+              </a:effectRef>
+              <a:fontRef idx="minor">
+                <a:schemeClr val="lt1"/>
+              </a:fontRef>
+            </p:style>
+            <p:txBody>
+              <a:bodyPr rtlCol="0" anchor="ctr"/>
+              <a:lstStyle/>
+              <a:p>
+                <a:pPr algn="ctr"/>
+                <a:endParaRPr lang="en-US">
+                  <a:solidFill>
+                    <a:srgbClr val="FFFFFF"/>
+                  </a:solidFill>
+                </a:endParaRPr>
+              </a:p>
+            </p:txBody>
+          </p:sp>
+          <p:pic>
+            <p:nvPicPr>
+              <p:cNvPr id="7" name="Picture 6">
+                <a:extLst>
+                  <a:ext uri="{FF2B5EF4-FFF2-40B4-BE49-F238E27FC236}">
+                    <a16:creationId xmlns:a16="http://schemas.microsoft.com/office/drawing/2014/main" id="{AAC3DB36-52F1-4CEF-AACE-6A4777A6AA93}"/>
+                  </a:ext>
+                </a:extLst>
+              </p:cNvPr>
+              <p:cNvPicPr>
+                <a:picLocks noChangeAspect="1"/>
+              </p:cNvPicPr>
+              <p:nvPr/>
+            </p:nvPicPr>
+            <p:blipFill>
+              <a:blip r:embed="rId8">
+                <a:extLst>
+                  <a:ext uri="{28A0092B-C50C-407E-A947-70E740481C1C}">
+                    <a14:useLocalDpi xmlns:a14="http://schemas.microsoft.com/office/drawing/2010/main" val="0"/>
+                  </a:ext>
+                </a:extLst>
+              </a:blip>
+              <a:stretch>
+                <a:fillRect/>
+              </a:stretch>
+            </p:blipFill>
+            <p:spPr>
+              <a:xfrm>
+                <a:off x="9275877" y="3460939"/>
+                <a:ext cx="1293046" cy="658981"/>
+              </a:xfrm>
+              <a:prstGeom prst="rect">
+                <a:avLst/>
+              </a:prstGeom>
+            </p:spPr>
+          </p:pic>
+        </p:grpSp>
+      </p:grpSp>
+      <p:sp>
+        <p:nvSpPr>
+          <p:cNvPr id="22" name="TextBox 21">
+            <a:extLst>
+              <a:ext uri="{FF2B5EF4-FFF2-40B4-BE49-F238E27FC236}">
+                <a16:creationId xmlns:a16="http://schemas.microsoft.com/office/drawing/2014/main" id="{35F038A1-1D7B-4A52-BF04-3AD4EA6BF06F}"/>
+              </a:ext>
+            </a:extLst>
+          </p:cNvPr>
+          <p:cNvSpPr txBox="1"/>
+          <p:nvPr/>
+        </p:nvSpPr>
+        <p:spPr>
+          <a:xfrm rot="20991049">
+            <a:off x="-449553" y="2399234"/>
+            <a:ext cx="6408991" cy="2221762"/>
+          </a:xfrm>
+          <a:prstGeom prst="rect">
+            <a:avLst/>
+          </a:prstGeom>
+          <a:noFill/>
+          <a:effectLst/>
+        </p:spPr>
+        <p:txBody>
+          <a:bodyPr wrap="square" anchor="ctr">
+            <a:spAutoFit/>
+          </a:bodyPr>
+          <a:lstStyle/>
+          <a:p>
+            <a:pPr algn="ctr">
+              <a:lnSpc>
+                <a:spcPts val="5000"/>
+              </a:lnSpc>
+            </a:pPr>
+            <a:r>
+              <a:rPr lang="en-GB" sz="2000" spc="100" dirty="0">
+                <a:solidFill>
+                  <a:srgbClr val="001A3E"/>
+                </a:solidFill>
+                <a:latin typeface="Nutmeg Regular" panose="00000500000000000000" pitchFamily="2" charset="0"/>
+                <a:ea typeface="Inter" panose="020B0502030000000004" pitchFamily="34" charset="0"/>
+                <a:cs typeface="Mark OT Light" charset="0"/>
+              </a:rPr>
+              <a:t>COMPREHENSIVE</a:t>
+            </a:r>
+            <a:endParaRPr lang="en-GB" sz="2800" spc="100" dirty="0">
+              <a:solidFill>
+                <a:srgbClr val="001A3E"/>
+              </a:solidFill>
+              <a:latin typeface="Nutmeg Regular" panose="00000500000000000000" pitchFamily="2" charset="0"/>
+              <a:ea typeface="Inter" panose="020B0502030000000004" pitchFamily="34" charset="0"/>
+              <a:cs typeface="Mark OT Light" charset="0"/>
+            </a:endParaRPr>
+          </a:p>
+          <a:p>
+            <a:pPr algn="ctr">
+              <a:lnSpc>
+                <a:spcPts val="5500"/>
+              </a:lnSpc>
+            </a:pPr>
+            <a:r>
+              <a:rPr lang="en-GB" sz="6600" spc="-210" dirty="0">
+                <a:solidFill>
+                  <a:srgbClr val="001A3E"/>
+                </a:solidFill>
+                <a:latin typeface="Nutmeg Black Italic" panose="00000900000000000000" pitchFamily="2" charset="0"/>
+                <a:ea typeface="Inter" panose="020B0502030000000004" pitchFamily="34" charset="0"/>
+                <a:cs typeface="Mark OT Light" charset="0"/>
+              </a:rPr>
+              <a:t>STUDY </a:t>
+            </a:r>
+            <a:br>
+              <a:rPr lang="en-GB" sz="6600" spc="-210" dirty="0">
+                <a:solidFill>
+                  <a:srgbClr val="001A3E"/>
+                </a:solidFill>
+                <a:latin typeface="Nutmeg Black Italic" panose="00000900000000000000" pitchFamily="2" charset="0"/>
+                <a:ea typeface="Inter" panose="020B0502030000000004" pitchFamily="34" charset="0"/>
+                <a:cs typeface="Mark OT Light" charset="0"/>
+              </a:rPr>
+            </a:br>
+            <a:r>
+              <a:rPr lang="en-GB" sz="6600" spc="-210" dirty="0">
+                <a:solidFill>
+                  <a:srgbClr val="001A3E"/>
+                </a:solidFill>
+                <a:latin typeface="Nutmeg Black Italic" panose="00000900000000000000" pitchFamily="2" charset="0"/>
+                <a:ea typeface="Inter" panose="020B0502030000000004" pitchFamily="34" charset="0"/>
+                <a:cs typeface="Mark OT Light" charset="0"/>
+              </a:rPr>
+              <a:t>GUIDE</a:t>
+            </a:r>
+          </a:p>
+        </p:txBody>
+      </p:sp>
+      <p:sp>
+        <p:nvSpPr>
+          <p:cNvPr id="14" name="TextBox 13">
+            <a:extLst>
+              <a:ext uri="{FF2B5EF4-FFF2-40B4-BE49-F238E27FC236}">
+                <a16:creationId xmlns:a16="http://schemas.microsoft.com/office/drawing/2014/main" id="{B4235A3A-5AD8-426B-B9A9-E6740CD8DB1A}"/>
+              </a:ext>
+            </a:extLst>
+          </p:cNvPr>
+          <p:cNvSpPr txBox="1"/>
+          <p:nvPr/>
+        </p:nvSpPr>
+        <p:spPr>
+          <a:xfrm rot="20991049">
+            <a:off x="1226612" y="1849261"/>
+            <a:ext cx="4879997" cy="623248"/>
+          </a:xfrm>
+          <a:prstGeom prst="rect">
+            <a:avLst/>
+          </a:prstGeom>
+          <a:noFill/>
+          <a:effectLst/>
+        </p:spPr>
+        <p:txBody>
+          <a:bodyPr wrap="square" anchor="ctr">
+            <a:spAutoFit/>
+          </a:bodyPr>
+          <a:lstStyle/>
+          <a:p>
+            <a:pPr algn="ctr">
+              <a:lnSpc>
+                <a:spcPts val="4400"/>
+              </a:lnSpc>
+            </a:pPr>
+            <a:r>
+              <a:rPr lang="en-GB" sz="2800" spc="100" dirty="0">
+                <a:solidFill>
+                  <a:srgbClr val="EFB504"/>
+                </a:solidFill>
+                <a:latin typeface="Bebas Neue" panose="020B0606020202050201" pitchFamily="34" charset="0"/>
+                <a:ea typeface="Inter" panose="020B0502030000000004" pitchFamily="34" charset="0"/>
+                <a:cs typeface="Mark OT Light" charset="0"/>
+              </a:rPr>
+              <a:t>PART 2</a:t>
+            </a:r>
+            <a:endParaRPr lang="en-GB" sz="4800" spc="-210" dirty="0">
+              <a:solidFill>
+                <a:srgbClr val="EFB504"/>
+              </a:solidFill>
+              <a:latin typeface="Bebas Neue" panose="020B0606020202050201" pitchFamily="34" charset="0"/>
+              <a:ea typeface="Inter" panose="020B0502030000000004" pitchFamily="34" charset="0"/>
+              <a:cs typeface="Mark OT Light" charset="0"/>
+            </a:endParaRPr>
+          </a:p>
+        </p:txBody>
+      </p:sp>
+    </p:spTree>
+    <p:extLst>
+      <p:ext uri="{BB962C8B-B14F-4D97-AF65-F5344CB8AC3E}">
+        <p14:creationId xmlns:p14="http://schemas.microsoft.com/office/powerpoint/2010/main" val="1092842927"/>
+      </p:ext>
+    </p:extLst>
+  </p:cSld>
+  <p:clrMapOvr>
+    <a:masterClrMapping/>
+  </p:clrMapOvr>
+</p:sld>
+</file>
+
 <file path=ppt/theme/theme1.xml><?xml version="1.0" encoding="utf-8"?>
 <a:theme xmlns:a="http://schemas.openxmlformats.org/drawingml/2006/main" name="Office Theme">
   <a:themeElements>

</xml_diff>